<commit_message>
Finished report and started adding the operations to the presentation
</commit_message>
<xml_diff>
--- a/misc/Apresentacao_calculadora.pptx
+++ b/misc/Apresentacao_calculadora.pptx
@@ -5,10 +5,10 @@
     <p:sldMasterId id="2147483812" r:id="rId4"/>
   </p:sldMasterIdLst>
   <p:notesMasterIdLst>
-    <p:notesMasterId r:id="rId32"/>
+    <p:notesMasterId r:id="rId34"/>
   </p:notesMasterIdLst>
   <p:handoutMasterIdLst>
-    <p:handoutMasterId r:id="rId33"/>
+    <p:handoutMasterId r:id="rId35"/>
   </p:handoutMasterIdLst>
   <p:sldIdLst>
     <p:sldId id="262" r:id="rId5"/>
@@ -37,7 +37,9 @@
     <p:sldId id="286" r:id="rId28"/>
     <p:sldId id="285" r:id="rId29"/>
     <p:sldId id="290" r:id="rId30"/>
-    <p:sldId id="267" r:id="rId31"/>
+    <p:sldId id="291" r:id="rId31"/>
+    <p:sldId id="292" r:id="rId32"/>
+    <p:sldId id="267" r:id="rId33"/>
   </p:sldIdLst>
   <p:sldSz cx="12192000" cy="6858000"/>
   <p:notesSz cx="6858000" cy="9144000"/>
@@ -1704,6 +1706,212 @@
 </c:chartSpace>
 </file>
 
+<file path=ppt/charts/chart23.xml><?xml version="1.0" encoding="utf-8"?>
+<c:chartSpace xmlns:c="http://schemas.openxmlformats.org/drawingml/2006/chart" xmlns:a="http://schemas.openxmlformats.org/drawingml/2006/main" xmlns:r="http://schemas.openxmlformats.org/officeDocument/2006/relationships" xmlns:c16r2="http://schemas.microsoft.com/office/drawing/2015/06/chart">
+  <c:date1904 val="0"/>
+  <c:lang val="pt-BR"/>
+  <c:roundedCorners val="0"/>
+  <mc:AlternateContent xmlns:mc="http://schemas.openxmlformats.org/markup-compatibility/2006">
+    <mc:Choice xmlns:c14="http://schemas.microsoft.com/office/drawing/2007/8/2/chart" Requires="c14">
+      <c14:style val="102"/>
+    </mc:Choice>
+    <mc:Fallback>
+      <c:style val="2"/>
+    </mc:Fallback>
+  </mc:AlternateContent>
+  <c:chart>
+    <c:autoTitleDeleted val="1"/>
+    <c:plotArea>
+      <c:layout/>
+      <c:pieChart>
+        <c:varyColors val="1"/>
+        <c:dLbls>
+          <c:showLegendKey val="0"/>
+          <c:showVal val="0"/>
+          <c:showCatName val="0"/>
+          <c:showSerName val="0"/>
+          <c:showPercent val="0"/>
+          <c:showBubbleSize val="0"/>
+          <c:showLeaderLines val="0"/>
+        </c:dLbls>
+        <c:firstSliceAng val="0"/>
+      </c:pieChart>
+      <c:spPr>
+        <a:noFill/>
+        <a:ln>
+          <a:noFill/>
+        </a:ln>
+        <a:effectLst/>
+      </c:spPr>
+    </c:plotArea>
+    <c:legend>
+      <c:legendPos val="b"/>
+      <c:overlay val="0"/>
+      <c:spPr>
+        <a:noFill/>
+        <a:ln>
+          <a:noFill/>
+        </a:ln>
+        <a:effectLst/>
+      </c:spPr>
+      <c:txPr>
+        <a:bodyPr rot="0" spcFirstLastPara="1" vertOverflow="ellipsis" vert="horz" wrap="square" anchor="ctr" anchorCtr="1"/>
+        <a:lstStyle/>
+        <a:p>
+          <a:pPr rtl="0">
+            <a:defRPr sz="1197" b="0" i="0" u="none" strike="noStrike" kern="1200" baseline="0">
+              <a:solidFill>
+                <a:schemeClr val="tx1">
+                  <a:lumMod val="65000"/>
+                  <a:lumOff val="35000"/>
+                </a:schemeClr>
+              </a:solidFill>
+              <a:latin typeface="+mn-lt"/>
+              <a:ea typeface="+mn-ea"/>
+              <a:cs typeface="+mn-cs"/>
+            </a:defRPr>
+          </a:pPr>
+          <a:endParaRPr lang="pt-BR"/>
+        </a:p>
+      </c:txPr>
+    </c:legend>
+    <c:plotVisOnly val="1"/>
+    <c:dispBlanksAs val="gap"/>
+    <c:extLst>
+      <c:ext xmlns:c16r3="http://schemas.microsoft.com/office/drawing/2017/03/chart" uri="{56B9EC1D-385E-4148-901F-78D8002777C0}">
+        <c16r3:dataDisplayOptions16>
+          <c16r3:dispNaAsBlank val="1"/>
+        </c16r3:dataDisplayOptions16>
+      </c:ext>
+    </c:extLst>
+    <c:showDLblsOverMax val="0"/>
+  </c:chart>
+  <c:spPr>
+    <a:noFill/>
+    <a:ln>
+      <a:noFill/>
+    </a:ln>
+    <a:effectLst/>
+  </c:spPr>
+  <c:txPr>
+    <a:bodyPr/>
+    <a:lstStyle/>
+    <a:p>
+      <a:pPr>
+        <a:defRPr/>
+      </a:pPr>
+      <a:endParaRPr lang="pt-BR"/>
+    </a:p>
+  </c:txPr>
+  <c:externalData r:id="rId3">
+    <c:autoUpdate val="0"/>
+  </c:externalData>
+</c:chartSpace>
+</file>
+
+<file path=ppt/charts/chart24.xml><?xml version="1.0" encoding="utf-8"?>
+<c:chartSpace xmlns:c="http://schemas.openxmlformats.org/drawingml/2006/chart" xmlns:a="http://schemas.openxmlformats.org/drawingml/2006/main" xmlns:r="http://schemas.openxmlformats.org/officeDocument/2006/relationships" xmlns:c16r2="http://schemas.microsoft.com/office/drawing/2015/06/chart">
+  <c:date1904 val="0"/>
+  <c:lang val="pt-BR"/>
+  <c:roundedCorners val="0"/>
+  <mc:AlternateContent xmlns:mc="http://schemas.openxmlformats.org/markup-compatibility/2006">
+    <mc:Choice xmlns:c14="http://schemas.microsoft.com/office/drawing/2007/8/2/chart" Requires="c14">
+      <c14:style val="102"/>
+    </mc:Choice>
+    <mc:Fallback>
+      <c:style val="2"/>
+    </mc:Fallback>
+  </mc:AlternateContent>
+  <c:chart>
+    <c:autoTitleDeleted val="1"/>
+    <c:plotArea>
+      <c:layout/>
+      <c:pieChart>
+        <c:varyColors val="1"/>
+        <c:dLbls>
+          <c:showLegendKey val="0"/>
+          <c:showVal val="0"/>
+          <c:showCatName val="0"/>
+          <c:showSerName val="0"/>
+          <c:showPercent val="0"/>
+          <c:showBubbleSize val="0"/>
+          <c:showLeaderLines val="0"/>
+        </c:dLbls>
+        <c:firstSliceAng val="0"/>
+      </c:pieChart>
+      <c:spPr>
+        <a:noFill/>
+        <a:ln>
+          <a:noFill/>
+        </a:ln>
+        <a:effectLst/>
+      </c:spPr>
+    </c:plotArea>
+    <c:legend>
+      <c:legendPos val="b"/>
+      <c:overlay val="0"/>
+      <c:spPr>
+        <a:noFill/>
+        <a:ln>
+          <a:noFill/>
+        </a:ln>
+        <a:effectLst/>
+      </c:spPr>
+      <c:txPr>
+        <a:bodyPr rot="0" spcFirstLastPara="1" vertOverflow="ellipsis" vert="horz" wrap="square" anchor="ctr" anchorCtr="1"/>
+        <a:lstStyle/>
+        <a:p>
+          <a:pPr rtl="0">
+            <a:defRPr sz="1197" b="0" i="0" u="none" strike="noStrike" kern="1200" baseline="0">
+              <a:solidFill>
+                <a:schemeClr val="tx1">
+                  <a:lumMod val="65000"/>
+                  <a:lumOff val="35000"/>
+                </a:schemeClr>
+              </a:solidFill>
+              <a:latin typeface="+mn-lt"/>
+              <a:ea typeface="+mn-ea"/>
+              <a:cs typeface="+mn-cs"/>
+            </a:defRPr>
+          </a:pPr>
+          <a:endParaRPr lang="pt-BR"/>
+        </a:p>
+      </c:txPr>
+    </c:legend>
+    <c:plotVisOnly val="1"/>
+    <c:dispBlanksAs val="gap"/>
+    <c:extLst>
+      <c:ext xmlns:c16r3="http://schemas.microsoft.com/office/drawing/2017/03/chart" uri="{56B9EC1D-385E-4148-901F-78D8002777C0}">
+        <c16r3:dataDisplayOptions16>
+          <c16r3:dispNaAsBlank val="1"/>
+        </c16r3:dataDisplayOptions16>
+      </c:ext>
+    </c:extLst>
+    <c:showDLblsOverMax val="0"/>
+  </c:chart>
+  <c:spPr>
+    <a:noFill/>
+    <a:ln>
+      <a:noFill/>
+    </a:ln>
+    <a:effectLst/>
+  </c:spPr>
+  <c:txPr>
+    <a:bodyPr/>
+    <a:lstStyle/>
+    <a:p>
+      <a:pPr>
+        <a:defRPr/>
+      </a:pPr>
+      <a:endParaRPr lang="pt-BR"/>
+    </a:p>
+  </c:txPr>
+  <c:externalData r:id="rId3">
+    <c:autoUpdate val="0"/>
+  </c:externalData>
+</c:chartSpace>
+</file>
+
 <file path=ppt/charts/chart3.xml><?xml version="1.0" encoding="utf-8"?>
 <c:chartSpace xmlns:c="http://schemas.openxmlformats.org/drawingml/2006/chart" xmlns:a="http://schemas.openxmlformats.org/drawingml/2006/main" xmlns:r="http://schemas.openxmlformats.org/officeDocument/2006/relationships" xmlns:c16r2="http://schemas.microsoft.com/office/drawing/2015/06/chart">
   <c:date1904 val="0"/>
@@ -2590,6 +2798,28 @@
 </cs:colorStyle>
 </file>
 
+<file path=ppt/charts/colors23.xml><?xml version="1.0" encoding="utf-8"?>
+<cs:colorStyle xmlns:cs="http://schemas.microsoft.com/office/drawing/2012/chartStyle" xmlns:a="http://schemas.openxmlformats.org/drawingml/2006/main" meth="acrossLinear" id="2">
+  <a:schemeClr val="accent1"/>
+  <a:schemeClr val="accent2"/>
+  <a:schemeClr val="accent3"/>
+  <a:schemeClr val="accent4"/>
+  <a:schemeClr val="accent5"/>
+  <a:schemeClr val="accent6"/>
+</cs:colorStyle>
+</file>
+
+<file path=ppt/charts/colors24.xml><?xml version="1.0" encoding="utf-8"?>
+<cs:colorStyle xmlns:cs="http://schemas.microsoft.com/office/drawing/2012/chartStyle" xmlns:a="http://schemas.openxmlformats.org/drawingml/2006/main" meth="acrossLinear" id="2">
+  <a:schemeClr val="accent1"/>
+  <a:schemeClr val="accent2"/>
+  <a:schemeClr val="accent3"/>
+  <a:schemeClr val="accent4"/>
+  <a:schemeClr val="accent5"/>
+  <a:schemeClr val="accent6"/>
+</cs:colorStyle>
+</file>
+
 <file path=ppt/charts/colors3.xml><?xml version="1.0" encoding="utf-8"?>
 <cs:colorStyle xmlns:cs="http://schemas.microsoft.com/office/drawing/2012/chartStyle" xmlns:a="http://schemas.openxmlformats.org/drawingml/2006/main" meth="acrossLinear" id="2">
   <a:schemeClr val="accent1"/>
@@ -9710,6 +9940,1012 @@
 </file>
 
 <file path=ppt/charts/style22.xml><?xml version="1.0" encoding="utf-8"?>
+<cs:chartStyle xmlns:cs="http://schemas.microsoft.com/office/drawing/2012/chartStyle" xmlns:a="http://schemas.openxmlformats.org/drawingml/2006/main" id="201">
+  <cs:axisTitle>
+    <cs:lnRef idx="0"/>
+    <cs:fillRef idx="0"/>
+    <cs:effectRef idx="0"/>
+    <cs:fontRef idx="minor">
+      <a:schemeClr val="tx1">
+        <a:lumMod val="65000"/>
+        <a:lumOff val="35000"/>
+      </a:schemeClr>
+    </cs:fontRef>
+    <cs:defRPr sz="1330" kern="1200"/>
+  </cs:axisTitle>
+  <cs:categoryAxis>
+    <cs:lnRef idx="0"/>
+    <cs:fillRef idx="0"/>
+    <cs:effectRef idx="0"/>
+    <cs:fontRef idx="minor">
+      <a:schemeClr val="tx1">
+        <a:lumMod val="65000"/>
+        <a:lumOff val="35000"/>
+      </a:schemeClr>
+    </cs:fontRef>
+    <cs:spPr>
+      <a:ln w="9525" cap="flat" cmpd="sng" algn="ctr">
+        <a:solidFill>
+          <a:schemeClr val="tx1">
+            <a:lumMod val="15000"/>
+            <a:lumOff val="85000"/>
+          </a:schemeClr>
+        </a:solidFill>
+        <a:round/>
+      </a:ln>
+    </cs:spPr>
+    <cs:defRPr sz="1197" kern="1200"/>
+  </cs:categoryAxis>
+  <cs:chartArea mods="allowNoFillOverride allowNoLineOverride">
+    <cs:lnRef idx="0"/>
+    <cs:fillRef idx="0"/>
+    <cs:effectRef idx="0"/>
+    <cs:fontRef idx="minor">
+      <a:schemeClr val="tx1"/>
+    </cs:fontRef>
+    <cs:spPr>
+      <a:solidFill>
+        <a:schemeClr val="bg1"/>
+      </a:solidFill>
+      <a:ln w="9525" cap="flat" cmpd="sng" algn="ctr">
+        <a:solidFill>
+          <a:schemeClr val="tx1">
+            <a:lumMod val="15000"/>
+            <a:lumOff val="85000"/>
+          </a:schemeClr>
+        </a:solidFill>
+        <a:round/>
+      </a:ln>
+    </cs:spPr>
+    <cs:defRPr sz="1330" kern="1200"/>
+  </cs:chartArea>
+  <cs:dataLabel>
+    <cs:lnRef idx="0"/>
+    <cs:fillRef idx="0"/>
+    <cs:effectRef idx="0"/>
+    <cs:fontRef idx="minor">
+      <a:schemeClr val="tx1">
+        <a:lumMod val="75000"/>
+        <a:lumOff val="25000"/>
+      </a:schemeClr>
+    </cs:fontRef>
+    <cs:defRPr sz="1197" kern="1200"/>
+  </cs:dataLabel>
+  <cs:dataLabelCallout>
+    <cs:lnRef idx="0"/>
+    <cs:fillRef idx="0"/>
+    <cs:effectRef idx="0"/>
+    <cs:fontRef idx="minor">
+      <a:schemeClr val="dk1">
+        <a:lumMod val="65000"/>
+        <a:lumOff val="35000"/>
+      </a:schemeClr>
+    </cs:fontRef>
+    <cs:spPr>
+      <a:solidFill>
+        <a:schemeClr val="lt1"/>
+      </a:solidFill>
+      <a:ln>
+        <a:solidFill>
+          <a:schemeClr val="dk1">
+            <a:lumMod val="25000"/>
+            <a:lumOff val="75000"/>
+          </a:schemeClr>
+        </a:solidFill>
+      </a:ln>
+    </cs:spPr>
+    <cs:defRPr sz="1197" kern="1200"/>
+    <cs:bodyPr rot="0" spcFirstLastPara="1" vertOverflow="clip" horzOverflow="clip" vert="horz" wrap="square" lIns="36576" tIns="18288" rIns="36576" bIns="18288" anchor="ctr" anchorCtr="1">
+      <a:spAutoFit/>
+    </cs:bodyPr>
+  </cs:dataLabelCallout>
+  <cs:dataPoint>
+    <cs:lnRef idx="0"/>
+    <cs:fillRef idx="1">
+      <cs:styleClr val="auto"/>
+    </cs:fillRef>
+    <cs:effectRef idx="0"/>
+    <cs:fontRef idx="minor">
+      <a:schemeClr val="tx1"/>
+    </cs:fontRef>
+  </cs:dataPoint>
+  <cs:dataPoint3D>
+    <cs:lnRef idx="0"/>
+    <cs:fillRef idx="1">
+      <cs:styleClr val="auto"/>
+    </cs:fillRef>
+    <cs:effectRef idx="0"/>
+    <cs:fontRef idx="minor">
+      <a:schemeClr val="tx1"/>
+    </cs:fontRef>
+  </cs:dataPoint3D>
+  <cs:dataPointLine>
+    <cs:lnRef idx="0">
+      <cs:styleClr val="auto"/>
+    </cs:lnRef>
+    <cs:fillRef idx="1"/>
+    <cs:effectRef idx="0"/>
+    <cs:fontRef idx="minor">
+      <a:schemeClr val="tx1"/>
+    </cs:fontRef>
+    <cs:spPr>
+      <a:ln w="28575" cap="rnd">
+        <a:solidFill>
+          <a:schemeClr val="phClr"/>
+        </a:solidFill>
+        <a:round/>
+      </a:ln>
+    </cs:spPr>
+  </cs:dataPointLine>
+  <cs:dataPointMarker>
+    <cs:lnRef idx="0">
+      <cs:styleClr val="auto"/>
+    </cs:lnRef>
+    <cs:fillRef idx="1">
+      <cs:styleClr val="auto"/>
+    </cs:fillRef>
+    <cs:effectRef idx="0"/>
+    <cs:fontRef idx="minor">
+      <a:schemeClr val="tx1"/>
+    </cs:fontRef>
+    <cs:spPr>
+      <a:ln w="9525">
+        <a:solidFill>
+          <a:schemeClr val="phClr"/>
+        </a:solidFill>
+      </a:ln>
+    </cs:spPr>
+  </cs:dataPointMarker>
+  <cs:dataPointMarkerLayout symbol="circle" size="5"/>
+  <cs:dataPointWireframe>
+    <cs:lnRef idx="0">
+      <cs:styleClr val="auto"/>
+    </cs:lnRef>
+    <cs:fillRef idx="1"/>
+    <cs:effectRef idx="0"/>
+    <cs:fontRef idx="minor">
+      <a:schemeClr val="tx1"/>
+    </cs:fontRef>
+    <cs:spPr>
+      <a:ln w="9525" cap="rnd">
+        <a:solidFill>
+          <a:schemeClr val="phClr"/>
+        </a:solidFill>
+        <a:round/>
+      </a:ln>
+    </cs:spPr>
+  </cs:dataPointWireframe>
+  <cs:dataTable>
+    <cs:lnRef idx="0"/>
+    <cs:fillRef idx="0"/>
+    <cs:effectRef idx="0"/>
+    <cs:fontRef idx="minor">
+      <a:schemeClr val="tx1">
+        <a:lumMod val="65000"/>
+        <a:lumOff val="35000"/>
+      </a:schemeClr>
+    </cs:fontRef>
+    <cs:spPr>
+      <a:noFill/>
+      <a:ln w="9525" cap="flat" cmpd="sng" algn="ctr">
+        <a:solidFill>
+          <a:schemeClr val="tx1">
+            <a:lumMod val="15000"/>
+            <a:lumOff val="85000"/>
+          </a:schemeClr>
+        </a:solidFill>
+        <a:round/>
+      </a:ln>
+    </cs:spPr>
+    <cs:defRPr sz="1197" kern="1200"/>
+  </cs:dataTable>
+  <cs:downBar>
+    <cs:lnRef idx="0"/>
+    <cs:fillRef idx="0"/>
+    <cs:effectRef idx="0"/>
+    <cs:fontRef idx="minor">
+      <a:schemeClr val="dk1"/>
+    </cs:fontRef>
+    <cs:spPr>
+      <a:solidFill>
+        <a:schemeClr val="dk1">
+          <a:lumMod val="65000"/>
+          <a:lumOff val="35000"/>
+        </a:schemeClr>
+      </a:solidFill>
+      <a:ln w="9525">
+        <a:solidFill>
+          <a:schemeClr val="tx1">
+            <a:lumMod val="65000"/>
+            <a:lumOff val="35000"/>
+          </a:schemeClr>
+        </a:solidFill>
+      </a:ln>
+    </cs:spPr>
+  </cs:downBar>
+  <cs:dropLine>
+    <cs:lnRef idx="0"/>
+    <cs:fillRef idx="0"/>
+    <cs:effectRef idx="0"/>
+    <cs:fontRef idx="minor">
+      <a:schemeClr val="tx1"/>
+    </cs:fontRef>
+    <cs:spPr>
+      <a:ln w="9525" cap="flat" cmpd="sng" algn="ctr">
+        <a:solidFill>
+          <a:schemeClr val="tx1">
+            <a:lumMod val="35000"/>
+            <a:lumOff val="65000"/>
+          </a:schemeClr>
+        </a:solidFill>
+        <a:round/>
+      </a:ln>
+    </cs:spPr>
+  </cs:dropLine>
+  <cs:errorBar>
+    <cs:lnRef idx="0"/>
+    <cs:fillRef idx="0"/>
+    <cs:effectRef idx="0"/>
+    <cs:fontRef idx="minor">
+      <a:schemeClr val="tx1"/>
+    </cs:fontRef>
+    <cs:spPr>
+      <a:ln w="9525" cap="flat" cmpd="sng" algn="ctr">
+        <a:solidFill>
+          <a:schemeClr val="tx1">
+            <a:lumMod val="65000"/>
+            <a:lumOff val="35000"/>
+          </a:schemeClr>
+        </a:solidFill>
+        <a:round/>
+      </a:ln>
+    </cs:spPr>
+  </cs:errorBar>
+  <cs:floor>
+    <cs:lnRef idx="0"/>
+    <cs:fillRef idx="0"/>
+    <cs:effectRef idx="0"/>
+    <cs:fontRef idx="minor">
+      <a:schemeClr val="tx1"/>
+    </cs:fontRef>
+    <cs:spPr>
+      <a:noFill/>
+      <a:ln>
+        <a:noFill/>
+      </a:ln>
+    </cs:spPr>
+  </cs:floor>
+  <cs:gridlineMajor>
+    <cs:lnRef idx="0"/>
+    <cs:fillRef idx="0"/>
+    <cs:effectRef idx="0"/>
+    <cs:fontRef idx="minor">
+      <a:schemeClr val="tx1"/>
+    </cs:fontRef>
+    <cs:spPr>
+      <a:ln w="9525" cap="flat" cmpd="sng" algn="ctr">
+        <a:solidFill>
+          <a:schemeClr val="tx1">
+            <a:lumMod val="15000"/>
+            <a:lumOff val="85000"/>
+          </a:schemeClr>
+        </a:solidFill>
+        <a:round/>
+      </a:ln>
+    </cs:spPr>
+  </cs:gridlineMajor>
+  <cs:gridlineMinor>
+    <cs:lnRef idx="0"/>
+    <cs:fillRef idx="0"/>
+    <cs:effectRef idx="0"/>
+    <cs:fontRef idx="minor">
+      <a:schemeClr val="tx1"/>
+    </cs:fontRef>
+    <cs:spPr>
+      <a:ln w="9525" cap="flat" cmpd="sng" algn="ctr">
+        <a:solidFill>
+          <a:schemeClr val="tx1">
+            <a:lumMod val="5000"/>
+            <a:lumOff val="95000"/>
+          </a:schemeClr>
+        </a:solidFill>
+        <a:round/>
+      </a:ln>
+    </cs:spPr>
+  </cs:gridlineMinor>
+  <cs:hiLoLine>
+    <cs:lnRef idx="0"/>
+    <cs:fillRef idx="0"/>
+    <cs:effectRef idx="0"/>
+    <cs:fontRef idx="minor">
+      <a:schemeClr val="tx1"/>
+    </cs:fontRef>
+    <cs:spPr>
+      <a:ln w="9525" cap="flat" cmpd="sng" algn="ctr">
+        <a:solidFill>
+          <a:schemeClr val="tx1">
+            <a:lumMod val="75000"/>
+            <a:lumOff val="25000"/>
+          </a:schemeClr>
+        </a:solidFill>
+        <a:round/>
+      </a:ln>
+    </cs:spPr>
+  </cs:hiLoLine>
+  <cs:leaderLine>
+    <cs:lnRef idx="0"/>
+    <cs:fillRef idx="0"/>
+    <cs:effectRef idx="0"/>
+    <cs:fontRef idx="minor">
+      <a:schemeClr val="tx1"/>
+    </cs:fontRef>
+    <cs:spPr>
+      <a:ln w="9525" cap="flat" cmpd="sng" algn="ctr">
+        <a:solidFill>
+          <a:schemeClr val="tx1">
+            <a:lumMod val="35000"/>
+            <a:lumOff val="65000"/>
+          </a:schemeClr>
+        </a:solidFill>
+        <a:round/>
+      </a:ln>
+    </cs:spPr>
+  </cs:leaderLine>
+  <cs:legend>
+    <cs:lnRef idx="0"/>
+    <cs:fillRef idx="0"/>
+    <cs:effectRef idx="0"/>
+    <cs:fontRef idx="minor">
+      <a:schemeClr val="tx1">
+        <a:lumMod val="65000"/>
+        <a:lumOff val="35000"/>
+      </a:schemeClr>
+    </cs:fontRef>
+    <cs:defRPr sz="1197" kern="1200"/>
+  </cs:legend>
+  <cs:plotArea mods="allowNoFillOverride allowNoLineOverride">
+    <cs:lnRef idx="0"/>
+    <cs:fillRef idx="0"/>
+    <cs:effectRef idx="0"/>
+    <cs:fontRef idx="minor">
+      <a:schemeClr val="tx1"/>
+    </cs:fontRef>
+  </cs:plotArea>
+  <cs:plotArea3D mods="allowNoFillOverride allowNoLineOverride">
+    <cs:lnRef idx="0"/>
+    <cs:fillRef idx="0"/>
+    <cs:effectRef idx="0"/>
+    <cs:fontRef idx="minor">
+      <a:schemeClr val="tx1"/>
+    </cs:fontRef>
+  </cs:plotArea3D>
+  <cs:seriesAxis>
+    <cs:lnRef idx="0"/>
+    <cs:fillRef idx="0"/>
+    <cs:effectRef idx="0"/>
+    <cs:fontRef idx="minor">
+      <a:schemeClr val="tx1">
+        <a:lumMod val="65000"/>
+        <a:lumOff val="35000"/>
+      </a:schemeClr>
+    </cs:fontRef>
+    <cs:defRPr sz="1197" kern="1200"/>
+  </cs:seriesAxis>
+  <cs:seriesLine>
+    <cs:lnRef idx="0"/>
+    <cs:fillRef idx="0"/>
+    <cs:effectRef idx="0"/>
+    <cs:fontRef idx="minor">
+      <a:schemeClr val="tx1"/>
+    </cs:fontRef>
+    <cs:spPr>
+      <a:ln w="9525" cap="flat" cmpd="sng" algn="ctr">
+        <a:solidFill>
+          <a:schemeClr val="tx1">
+            <a:lumMod val="35000"/>
+            <a:lumOff val="65000"/>
+          </a:schemeClr>
+        </a:solidFill>
+        <a:round/>
+      </a:ln>
+    </cs:spPr>
+  </cs:seriesLine>
+  <cs:title>
+    <cs:lnRef idx="0"/>
+    <cs:fillRef idx="0"/>
+    <cs:effectRef idx="0"/>
+    <cs:fontRef idx="minor">
+      <a:schemeClr val="tx1">
+        <a:lumMod val="65000"/>
+        <a:lumOff val="35000"/>
+      </a:schemeClr>
+    </cs:fontRef>
+    <cs:defRPr sz="1862" b="0" kern="1200" spc="0" baseline="0"/>
+  </cs:title>
+  <cs:trendline>
+    <cs:lnRef idx="0">
+      <cs:styleClr val="auto"/>
+    </cs:lnRef>
+    <cs:fillRef idx="0"/>
+    <cs:effectRef idx="0"/>
+    <cs:fontRef idx="minor">
+      <a:schemeClr val="tx1"/>
+    </cs:fontRef>
+    <cs:spPr>
+      <a:ln w="19050" cap="rnd">
+        <a:solidFill>
+          <a:schemeClr val="phClr"/>
+        </a:solidFill>
+        <a:prstDash val="sysDot"/>
+      </a:ln>
+    </cs:spPr>
+  </cs:trendline>
+  <cs:trendlineLabel>
+    <cs:lnRef idx="0"/>
+    <cs:fillRef idx="0"/>
+    <cs:effectRef idx="0"/>
+    <cs:fontRef idx="minor">
+      <a:schemeClr val="tx1">
+        <a:lumMod val="65000"/>
+        <a:lumOff val="35000"/>
+      </a:schemeClr>
+    </cs:fontRef>
+    <cs:defRPr sz="1197" kern="1200"/>
+  </cs:trendlineLabel>
+  <cs:upBar>
+    <cs:lnRef idx="0"/>
+    <cs:fillRef idx="0"/>
+    <cs:effectRef idx="0"/>
+    <cs:fontRef idx="minor">
+      <a:schemeClr val="dk1"/>
+    </cs:fontRef>
+    <cs:spPr>
+      <a:solidFill>
+        <a:schemeClr val="lt1"/>
+      </a:solidFill>
+      <a:ln w="9525">
+        <a:solidFill>
+          <a:schemeClr val="tx1">
+            <a:lumMod val="15000"/>
+            <a:lumOff val="85000"/>
+          </a:schemeClr>
+        </a:solidFill>
+      </a:ln>
+    </cs:spPr>
+  </cs:upBar>
+  <cs:valueAxis>
+    <cs:lnRef idx="0"/>
+    <cs:fillRef idx="0"/>
+    <cs:effectRef idx="0"/>
+    <cs:fontRef idx="minor">
+      <a:schemeClr val="tx1">
+        <a:lumMod val="65000"/>
+        <a:lumOff val="35000"/>
+      </a:schemeClr>
+    </cs:fontRef>
+    <cs:defRPr sz="1197" kern="1200"/>
+  </cs:valueAxis>
+  <cs:wall>
+    <cs:lnRef idx="0"/>
+    <cs:fillRef idx="0"/>
+    <cs:effectRef idx="0"/>
+    <cs:fontRef idx="minor">
+      <a:schemeClr val="tx1"/>
+    </cs:fontRef>
+    <cs:spPr>
+      <a:noFill/>
+      <a:ln>
+        <a:noFill/>
+      </a:ln>
+    </cs:spPr>
+  </cs:wall>
+</cs:chartStyle>
+</file>
+
+<file path=ppt/charts/style23.xml><?xml version="1.0" encoding="utf-8"?>
+<cs:chartStyle xmlns:cs="http://schemas.microsoft.com/office/drawing/2012/chartStyle" xmlns:a="http://schemas.openxmlformats.org/drawingml/2006/main" id="201">
+  <cs:axisTitle>
+    <cs:lnRef idx="0"/>
+    <cs:fillRef idx="0"/>
+    <cs:effectRef idx="0"/>
+    <cs:fontRef idx="minor">
+      <a:schemeClr val="tx1">
+        <a:lumMod val="65000"/>
+        <a:lumOff val="35000"/>
+      </a:schemeClr>
+    </cs:fontRef>
+    <cs:defRPr sz="1330" kern="1200"/>
+  </cs:axisTitle>
+  <cs:categoryAxis>
+    <cs:lnRef idx="0"/>
+    <cs:fillRef idx="0"/>
+    <cs:effectRef idx="0"/>
+    <cs:fontRef idx="minor">
+      <a:schemeClr val="tx1">
+        <a:lumMod val="65000"/>
+        <a:lumOff val="35000"/>
+      </a:schemeClr>
+    </cs:fontRef>
+    <cs:spPr>
+      <a:ln w="9525" cap="flat" cmpd="sng" algn="ctr">
+        <a:solidFill>
+          <a:schemeClr val="tx1">
+            <a:lumMod val="15000"/>
+            <a:lumOff val="85000"/>
+          </a:schemeClr>
+        </a:solidFill>
+        <a:round/>
+      </a:ln>
+    </cs:spPr>
+    <cs:defRPr sz="1197" kern="1200"/>
+  </cs:categoryAxis>
+  <cs:chartArea mods="allowNoFillOverride allowNoLineOverride">
+    <cs:lnRef idx="0"/>
+    <cs:fillRef idx="0"/>
+    <cs:effectRef idx="0"/>
+    <cs:fontRef idx="minor">
+      <a:schemeClr val="tx1"/>
+    </cs:fontRef>
+    <cs:spPr>
+      <a:solidFill>
+        <a:schemeClr val="bg1"/>
+      </a:solidFill>
+      <a:ln w="9525" cap="flat" cmpd="sng" algn="ctr">
+        <a:solidFill>
+          <a:schemeClr val="tx1">
+            <a:lumMod val="15000"/>
+            <a:lumOff val="85000"/>
+          </a:schemeClr>
+        </a:solidFill>
+        <a:round/>
+      </a:ln>
+    </cs:spPr>
+    <cs:defRPr sz="1330" kern="1200"/>
+  </cs:chartArea>
+  <cs:dataLabel>
+    <cs:lnRef idx="0"/>
+    <cs:fillRef idx="0"/>
+    <cs:effectRef idx="0"/>
+    <cs:fontRef idx="minor">
+      <a:schemeClr val="tx1">
+        <a:lumMod val="75000"/>
+        <a:lumOff val="25000"/>
+      </a:schemeClr>
+    </cs:fontRef>
+    <cs:defRPr sz="1197" kern="1200"/>
+  </cs:dataLabel>
+  <cs:dataLabelCallout>
+    <cs:lnRef idx="0"/>
+    <cs:fillRef idx="0"/>
+    <cs:effectRef idx="0"/>
+    <cs:fontRef idx="minor">
+      <a:schemeClr val="dk1">
+        <a:lumMod val="65000"/>
+        <a:lumOff val="35000"/>
+      </a:schemeClr>
+    </cs:fontRef>
+    <cs:spPr>
+      <a:solidFill>
+        <a:schemeClr val="lt1"/>
+      </a:solidFill>
+      <a:ln>
+        <a:solidFill>
+          <a:schemeClr val="dk1">
+            <a:lumMod val="25000"/>
+            <a:lumOff val="75000"/>
+          </a:schemeClr>
+        </a:solidFill>
+      </a:ln>
+    </cs:spPr>
+    <cs:defRPr sz="1197" kern="1200"/>
+    <cs:bodyPr rot="0" spcFirstLastPara="1" vertOverflow="clip" horzOverflow="clip" vert="horz" wrap="square" lIns="36576" tIns="18288" rIns="36576" bIns="18288" anchor="ctr" anchorCtr="1">
+      <a:spAutoFit/>
+    </cs:bodyPr>
+  </cs:dataLabelCallout>
+  <cs:dataPoint>
+    <cs:lnRef idx="0"/>
+    <cs:fillRef idx="1">
+      <cs:styleClr val="auto"/>
+    </cs:fillRef>
+    <cs:effectRef idx="0"/>
+    <cs:fontRef idx="minor">
+      <a:schemeClr val="tx1"/>
+    </cs:fontRef>
+  </cs:dataPoint>
+  <cs:dataPoint3D>
+    <cs:lnRef idx="0"/>
+    <cs:fillRef idx="1">
+      <cs:styleClr val="auto"/>
+    </cs:fillRef>
+    <cs:effectRef idx="0"/>
+    <cs:fontRef idx="minor">
+      <a:schemeClr val="tx1"/>
+    </cs:fontRef>
+  </cs:dataPoint3D>
+  <cs:dataPointLine>
+    <cs:lnRef idx="0">
+      <cs:styleClr val="auto"/>
+    </cs:lnRef>
+    <cs:fillRef idx="1"/>
+    <cs:effectRef idx="0"/>
+    <cs:fontRef idx="minor">
+      <a:schemeClr val="tx1"/>
+    </cs:fontRef>
+    <cs:spPr>
+      <a:ln w="28575" cap="rnd">
+        <a:solidFill>
+          <a:schemeClr val="phClr"/>
+        </a:solidFill>
+        <a:round/>
+      </a:ln>
+    </cs:spPr>
+  </cs:dataPointLine>
+  <cs:dataPointMarker>
+    <cs:lnRef idx="0">
+      <cs:styleClr val="auto"/>
+    </cs:lnRef>
+    <cs:fillRef idx="1">
+      <cs:styleClr val="auto"/>
+    </cs:fillRef>
+    <cs:effectRef idx="0"/>
+    <cs:fontRef idx="minor">
+      <a:schemeClr val="tx1"/>
+    </cs:fontRef>
+    <cs:spPr>
+      <a:ln w="9525">
+        <a:solidFill>
+          <a:schemeClr val="phClr"/>
+        </a:solidFill>
+      </a:ln>
+    </cs:spPr>
+  </cs:dataPointMarker>
+  <cs:dataPointMarkerLayout symbol="circle" size="5"/>
+  <cs:dataPointWireframe>
+    <cs:lnRef idx="0">
+      <cs:styleClr val="auto"/>
+    </cs:lnRef>
+    <cs:fillRef idx="1"/>
+    <cs:effectRef idx="0"/>
+    <cs:fontRef idx="minor">
+      <a:schemeClr val="tx1"/>
+    </cs:fontRef>
+    <cs:spPr>
+      <a:ln w="9525" cap="rnd">
+        <a:solidFill>
+          <a:schemeClr val="phClr"/>
+        </a:solidFill>
+        <a:round/>
+      </a:ln>
+    </cs:spPr>
+  </cs:dataPointWireframe>
+  <cs:dataTable>
+    <cs:lnRef idx="0"/>
+    <cs:fillRef idx="0"/>
+    <cs:effectRef idx="0"/>
+    <cs:fontRef idx="minor">
+      <a:schemeClr val="tx1">
+        <a:lumMod val="65000"/>
+        <a:lumOff val="35000"/>
+      </a:schemeClr>
+    </cs:fontRef>
+    <cs:spPr>
+      <a:noFill/>
+      <a:ln w="9525" cap="flat" cmpd="sng" algn="ctr">
+        <a:solidFill>
+          <a:schemeClr val="tx1">
+            <a:lumMod val="15000"/>
+            <a:lumOff val="85000"/>
+          </a:schemeClr>
+        </a:solidFill>
+        <a:round/>
+      </a:ln>
+    </cs:spPr>
+    <cs:defRPr sz="1197" kern="1200"/>
+  </cs:dataTable>
+  <cs:downBar>
+    <cs:lnRef idx="0"/>
+    <cs:fillRef idx="0"/>
+    <cs:effectRef idx="0"/>
+    <cs:fontRef idx="minor">
+      <a:schemeClr val="dk1"/>
+    </cs:fontRef>
+    <cs:spPr>
+      <a:solidFill>
+        <a:schemeClr val="dk1">
+          <a:lumMod val="65000"/>
+          <a:lumOff val="35000"/>
+        </a:schemeClr>
+      </a:solidFill>
+      <a:ln w="9525">
+        <a:solidFill>
+          <a:schemeClr val="tx1">
+            <a:lumMod val="65000"/>
+            <a:lumOff val="35000"/>
+          </a:schemeClr>
+        </a:solidFill>
+      </a:ln>
+    </cs:spPr>
+  </cs:downBar>
+  <cs:dropLine>
+    <cs:lnRef idx="0"/>
+    <cs:fillRef idx="0"/>
+    <cs:effectRef idx="0"/>
+    <cs:fontRef idx="minor">
+      <a:schemeClr val="tx1"/>
+    </cs:fontRef>
+    <cs:spPr>
+      <a:ln w="9525" cap="flat" cmpd="sng" algn="ctr">
+        <a:solidFill>
+          <a:schemeClr val="tx1">
+            <a:lumMod val="35000"/>
+            <a:lumOff val="65000"/>
+          </a:schemeClr>
+        </a:solidFill>
+        <a:round/>
+      </a:ln>
+    </cs:spPr>
+  </cs:dropLine>
+  <cs:errorBar>
+    <cs:lnRef idx="0"/>
+    <cs:fillRef idx="0"/>
+    <cs:effectRef idx="0"/>
+    <cs:fontRef idx="minor">
+      <a:schemeClr val="tx1"/>
+    </cs:fontRef>
+    <cs:spPr>
+      <a:ln w="9525" cap="flat" cmpd="sng" algn="ctr">
+        <a:solidFill>
+          <a:schemeClr val="tx1">
+            <a:lumMod val="65000"/>
+            <a:lumOff val="35000"/>
+          </a:schemeClr>
+        </a:solidFill>
+        <a:round/>
+      </a:ln>
+    </cs:spPr>
+  </cs:errorBar>
+  <cs:floor>
+    <cs:lnRef idx="0"/>
+    <cs:fillRef idx="0"/>
+    <cs:effectRef idx="0"/>
+    <cs:fontRef idx="minor">
+      <a:schemeClr val="tx1"/>
+    </cs:fontRef>
+    <cs:spPr>
+      <a:noFill/>
+      <a:ln>
+        <a:noFill/>
+      </a:ln>
+    </cs:spPr>
+  </cs:floor>
+  <cs:gridlineMajor>
+    <cs:lnRef idx="0"/>
+    <cs:fillRef idx="0"/>
+    <cs:effectRef idx="0"/>
+    <cs:fontRef idx="minor">
+      <a:schemeClr val="tx1"/>
+    </cs:fontRef>
+    <cs:spPr>
+      <a:ln w="9525" cap="flat" cmpd="sng" algn="ctr">
+        <a:solidFill>
+          <a:schemeClr val="tx1">
+            <a:lumMod val="15000"/>
+            <a:lumOff val="85000"/>
+          </a:schemeClr>
+        </a:solidFill>
+        <a:round/>
+      </a:ln>
+    </cs:spPr>
+  </cs:gridlineMajor>
+  <cs:gridlineMinor>
+    <cs:lnRef idx="0"/>
+    <cs:fillRef idx="0"/>
+    <cs:effectRef idx="0"/>
+    <cs:fontRef idx="minor">
+      <a:schemeClr val="tx1"/>
+    </cs:fontRef>
+    <cs:spPr>
+      <a:ln w="9525" cap="flat" cmpd="sng" algn="ctr">
+        <a:solidFill>
+          <a:schemeClr val="tx1">
+            <a:lumMod val="5000"/>
+            <a:lumOff val="95000"/>
+          </a:schemeClr>
+        </a:solidFill>
+        <a:round/>
+      </a:ln>
+    </cs:spPr>
+  </cs:gridlineMinor>
+  <cs:hiLoLine>
+    <cs:lnRef idx="0"/>
+    <cs:fillRef idx="0"/>
+    <cs:effectRef idx="0"/>
+    <cs:fontRef idx="minor">
+      <a:schemeClr val="tx1"/>
+    </cs:fontRef>
+    <cs:spPr>
+      <a:ln w="9525" cap="flat" cmpd="sng" algn="ctr">
+        <a:solidFill>
+          <a:schemeClr val="tx1">
+            <a:lumMod val="75000"/>
+            <a:lumOff val="25000"/>
+          </a:schemeClr>
+        </a:solidFill>
+        <a:round/>
+      </a:ln>
+    </cs:spPr>
+  </cs:hiLoLine>
+  <cs:leaderLine>
+    <cs:lnRef idx="0"/>
+    <cs:fillRef idx="0"/>
+    <cs:effectRef idx="0"/>
+    <cs:fontRef idx="minor">
+      <a:schemeClr val="tx1"/>
+    </cs:fontRef>
+    <cs:spPr>
+      <a:ln w="9525" cap="flat" cmpd="sng" algn="ctr">
+        <a:solidFill>
+          <a:schemeClr val="tx1">
+            <a:lumMod val="35000"/>
+            <a:lumOff val="65000"/>
+          </a:schemeClr>
+        </a:solidFill>
+        <a:round/>
+      </a:ln>
+    </cs:spPr>
+  </cs:leaderLine>
+  <cs:legend>
+    <cs:lnRef idx="0"/>
+    <cs:fillRef idx="0"/>
+    <cs:effectRef idx="0"/>
+    <cs:fontRef idx="minor">
+      <a:schemeClr val="tx1">
+        <a:lumMod val="65000"/>
+        <a:lumOff val="35000"/>
+      </a:schemeClr>
+    </cs:fontRef>
+    <cs:defRPr sz="1197" kern="1200"/>
+  </cs:legend>
+  <cs:plotArea mods="allowNoFillOverride allowNoLineOverride">
+    <cs:lnRef idx="0"/>
+    <cs:fillRef idx="0"/>
+    <cs:effectRef idx="0"/>
+    <cs:fontRef idx="minor">
+      <a:schemeClr val="tx1"/>
+    </cs:fontRef>
+  </cs:plotArea>
+  <cs:plotArea3D mods="allowNoFillOverride allowNoLineOverride">
+    <cs:lnRef idx="0"/>
+    <cs:fillRef idx="0"/>
+    <cs:effectRef idx="0"/>
+    <cs:fontRef idx="minor">
+      <a:schemeClr val="tx1"/>
+    </cs:fontRef>
+  </cs:plotArea3D>
+  <cs:seriesAxis>
+    <cs:lnRef idx="0"/>
+    <cs:fillRef idx="0"/>
+    <cs:effectRef idx="0"/>
+    <cs:fontRef idx="minor">
+      <a:schemeClr val="tx1">
+        <a:lumMod val="65000"/>
+        <a:lumOff val="35000"/>
+      </a:schemeClr>
+    </cs:fontRef>
+    <cs:defRPr sz="1197" kern="1200"/>
+  </cs:seriesAxis>
+  <cs:seriesLine>
+    <cs:lnRef idx="0"/>
+    <cs:fillRef idx="0"/>
+    <cs:effectRef idx="0"/>
+    <cs:fontRef idx="minor">
+      <a:schemeClr val="tx1"/>
+    </cs:fontRef>
+    <cs:spPr>
+      <a:ln w="9525" cap="flat" cmpd="sng" algn="ctr">
+        <a:solidFill>
+          <a:schemeClr val="tx1">
+            <a:lumMod val="35000"/>
+            <a:lumOff val="65000"/>
+          </a:schemeClr>
+        </a:solidFill>
+        <a:round/>
+      </a:ln>
+    </cs:spPr>
+  </cs:seriesLine>
+  <cs:title>
+    <cs:lnRef idx="0"/>
+    <cs:fillRef idx="0"/>
+    <cs:effectRef idx="0"/>
+    <cs:fontRef idx="minor">
+      <a:schemeClr val="tx1">
+        <a:lumMod val="65000"/>
+        <a:lumOff val="35000"/>
+      </a:schemeClr>
+    </cs:fontRef>
+    <cs:defRPr sz="1862" b="0" kern="1200" spc="0" baseline="0"/>
+  </cs:title>
+  <cs:trendline>
+    <cs:lnRef idx="0">
+      <cs:styleClr val="auto"/>
+    </cs:lnRef>
+    <cs:fillRef idx="0"/>
+    <cs:effectRef idx="0"/>
+    <cs:fontRef idx="minor">
+      <a:schemeClr val="tx1"/>
+    </cs:fontRef>
+    <cs:spPr>
+      <a:ln w="19050" cap="rnd">
+        <a:solidFill>
+          <a:schemeClr val="phClr"/>
+        </a:solidFill>
+        <a:prstDash val="sysDot"/>
+      </a:ln>
+    </cs:spPr>
+  </cs:trendline>
+  <cs:trendlineLabel>
+    <cs:lnRef idx="0"/>
+    <cs:fillRef idx="0"/>
+    <cs:effectRef idx="0"/>
+    <cs:fontRef idx="minor">
+      <a:schemeClr val="tx1">
+        <a:lumMod val="65000"/>
+        <a:lumOff val="35000"/>
+      </a:schemeClr>
+    </cs:fontRef>
+    <cs:defRPr sz="1197" kern="1200"/>
+  </cs:trendlineLabel>
+  <cs:upBar>
+    <cs:lnRef idx="0"/>
+    <cs:fillRef idx="0"/>
+    <cs:effectRef idx="0"/>
+    <cs:fontRef idx="minor">
+      <a:schemeClr val="dk1"/>
+    </cs:fontRef>
+    <cs:spPr>
+      <a:solidFill>
+        <a:schemeClr val="lt1"/>
+      </a:solidFill>
+      <a:ln w="9525">
+        <a:solidFill>
+          <a:schemeClr val="tx1">
+            <a:lumMod val="15000"/>
+            <a:lumOff val="85000"/>
+          </a:schemeClr>
+        </a:solidFill>
+      </a:ln>
+    </cs:spPr>
+  </cs:upBar>
+  <cs:valueAxis>
+    <cs:lnRef idx="0"/>
+    <cs:fillRef idx="0"/>
+    <cs:effectRef idx="0"/>
+    <cs:fontRef idx="minor">
+      <a:schemeClr val="tx1">
+        <a:lumMod val="65000"/>
+        <a:lumOff val="35000"/>
+      </a:schemeClr>
+    </cs:fontRef>
+    <cs:defRPr sz="1197" kern="1200"/>
+  </cs:valueAxis>
+  <cs:wall>
+    <cs:lnRef idx="0"/>
+    <cs:fillRef idx="0"/>
+    <cs:effectRef idx="0"/>
+    <cs:fontRef idx="minor">
+      <a:schemeClr val="tx1"/>
+    </cs:fontRef>
+    <cs:spPr>
+      <a:noFill/>
+      <a:ln>
+        <a:noFill/>
+      </a:ln>
+    </cs:spPr>
+  </cs:wall>
+</cs:chartStyle>
+</file>
+
+<file path=ppt/charts/style24.xml><?xml version="1.0" encoding="utf-8"?>
 <cs:chartStyle xmlns:cs="http://schemas.microsoft.com/office/drawing/2012/chartStyle" xmlns:a="http://schemas.openxmlformats.org/drawingml/2006/main" id="201">
   <cs:axisTitle>
     <cs:lnRef idx="0"/>
@@ -14624,7 +15860,7 @@
           <a:pPr rtl="0"/>
           <a:r>
             <a:rPr lang="pt-BR" noProof="0" dirty="0"/>
-            <a:t>4 Operações Básicas</a:t>
+            <a:t>4 Operações Básicas e 3 Complexas</a:t>
           </a:r>
         </a:p>
       </dgm:t>
@@ -14905,7 +16141,7 @@
           </a:pPr>
           <a:r>
             <a:rPr lang="pt-BR" sz="3600" kern="1200" noProof="0" dirty="0"/>
-            <a:t>4 Operações Básicas</a:t>
+            <a:t>4 Operações Básicas e 3 Complexas</a:t>
           </a:r>
         </a:p>
       </dsp:txBody>
@@ -16305,7 +17541,7 @@
           <a:p>
             <a:fld id="{31C38EC7-2E21-4BBC-8CC7-B60B40370E6C}" type="datetime1">
               <a:rPr lang="pt-BR" smtClean="0"/>
-              <a:t>08/11/2020</a:t>
+              <a:t>09/11/2020</a:t>
             </a:fld>
             <a:endParaRPr lang="pt-BR"/>
           </a:p>
@@ -16485,7 +17721,7 @@
             <a:pPr rtl="0"/>
             <a:fld id="{F649CAB4-C6FC-4A9E-9ED6-AE85ACE7E964}" type="datetime1">
               <a:rPr lang="pt-BR" noProof="0" smtClean="0"/>
-              <a:t>08/11/2020</a:t>
+              <a:t>09/11/2020</a:t>
             </a:fld>
             <a:endParaRPr lang="pt-BR" noProof="0"/>
           </a:p>
@@ -18276,6 +19512,176 @@
     </p:spTree>
     <p:extLst>
       <p:ext uri="{BB962C8B-B14F-4D97-AF65-F5344CB8AC3E}">
+        <p14:creationId xmlns:p14="http://schemas.microsoft.com/office/powerpoint/2010/main" val="3065224559"/>
+      </p:ext>
+    </p:extLst>
+  </p:cSld>
+  <p:clrMapOvr>
+    <a:masterClrMapping/>
+  </p:clrMapOvr>
+</p:notes>
+</file>
+
+<file path=ppt/notesSlides/notesSlide26.xml><?xml version="1.0" encoding="utf-8"?>
+<p:notes xmlns:a="http://schemas.openxmlformats.org/drawingml/2006/main" xmlns:r="http://schemas.openxmlformats.org/officeDocument/2006/relationships" xmlns:p="http://schemas.openxmlformats.org/presentationml/2006/main">
+  <p:cSld>
+    <p:spTree>
+      <p:nvGrpSpPr>
+        <p:cNvPr id="1" name=""/>
+        <p:cNvGrpSpPr/>
+        <p:nvPr/>
+      </p:nvGrpSpPr>
+      <p:grpSpPr>
+        <a:xfrm>
+          <a:off x="0" y="0"/>
+          <a:ext cx="0" cy="0"/>
+          <a:chOff x="0" y="0"/>
+          <a:chExt cx="0" cy="0"/>
+        </a:xfrm>
+      </p:grpSpPr>
+      <p:sp>
+        <p:nvSpPr>
+          <p:cNvPr id="2" name="Espaço Reservado para Imagem de Slide 1"/>
+          <p:cNvSpPr>
+            <a:spLocks noGrp="1" noRot="1" noChangeAspect="1"/>
+          </p:cNvSpPr>
+          <p:nvPr>
+            <p:ph type="sldImg"/>
+          </p:nvPr>
+        </p:nvSpPr>
+        <p:spPr/>
+      </p:sp>
+      <p:sp>
+        <p:nvSpPr>
+          <p:cNvPr id="3" name="Espaço Reservado para Anotações 2"/>
+          <p:cNvSpPr>
+            <a:spLocks noGrp="1"/>
+          </p:cNvSpPr>
+          <p:nvPr>
+            <p:ph type="body" idx="1"/>
+          </p:nvPr>
+        </p:nvSpPr>
+        <p:spPr/>
+        <p:txBody>
+          <a:bodyPr/>
+          <a:lstStyle/>
+          <a:p>
+            <a:endParaRPr lang="pt-BR"/>
+          </a:p>
+        </p:txBody>
+      </p:sp>
+      <p:sp>
+        <p:nvSpPr>
+          <p:cNvPr id="4" name="Espaço Reservado para Número de Slide 3"/>
+          <p:cNvSpPr>
+            <a:spLocks noGrp="1"/>
+          </p:cNvSpPr>
+          <p:nvPr>
+            <p:ph type="sldNum" sz="quarter" idx="5"/>
+          </p:nvPr>
+        </p:nvSpPr>
+        <p:spPr/>
+        <p:txBody>
+          <a:bodyPr/>
+          <a:lstStyle/>
+          <a:p>
+            <a:pPr rtl="0"/>
+            <a:fld id="{5E8C15C5-0688-5345-99FC-721E08AD15D5}" type="slidenum">
+              <a:rPr lang="pt-BR" noProof="0" smtClean="0"/>
+              <a:t>28</a:t>
+            </a:fld>
+            <a:endParaRPr lang="pt-BR" noProof="0"/>
+          </a:p>
+        </p:txBody>
+      </p:sp>
+    </p:spTree>
+    <p:extLst>
+      <p:ext uri="{BB962C8B-B14F-4D97-AF65-F5344CB8AC3E}">
+        <p14:creationId xmlns:p14="http://schemas.microsoft.com/office/powerpoint/2010/main" val="2129025949"/>
+      </p:ext>
+    </p:extLst>
+  </p:cSld>
+  <p:clrMapOvr>
+    <a:masterClrMapping/>
+  </p:clrMapOvr>
+</p:notes>
+</file>
+
+<file path=ppt/notesSlides/notesSlide27.xml><?xml version="1.0" encoding="utf-8"?>
+<p:notes xmlns:a="http://schemas.openxmlformats.org/drawingml/2006/main" xmlns:r="http://schemas.openxmlformats.org/officeDocument/2006/relationships" xmlns:p="http://schemas.openxmlformats.org/presentationml/2006/main">
+  <p:cSld>
+    <p:spTree>
+      <p:nvGrpSpPr>
+        <p:cNvPr id="1" name=""/>
+        <p:cNvGrpSpPr/>
+        <p:nvPr/>
+      </p:nvGrpSpPr>
+      <p:grpSpPr>
+        <a:xfrm>
+          <a:off x="0" y="0"/>
+          <a:ext cx="0" cy="0"/>
+          <a:chOff x="0" y="0"/>
+          <a:chExt cx="0" cy="0"/>
+        </a:xfrm>
+      </p:grpSpPr>
+      <p:sp>
+        <p:nvSpPr>
+          <p:cNvPr id="2" name="Espaço Reservado para Imagem de Slide 1"/>
+          <p:cNvSpPr>
+            <a:spLocks noGrp="1" noRot="1" noChangeAspect="1"/>
+          </p:cNvSpPr>
+          <p:nvPr>
+            <p:ph type="sldImg"/>
+          </p:nvPr>
+        </p:nvSpPr>
+        <p:spPr/>
+      </p:sp>
+      <p:sp>
+        <p:nvSpPr>
+          <p:cNvPr id="3" name="Espaço Reservado para Anotações 2"/>
+          <p:cNvSpPr>
+            <a:spLocks noGrp="1"/>
+          </p:cNvSpPr>
+          <p:nvPr>
+            <p:ph type="body" idx="1"/>
+          </p:nvPr>
+        </p:nvSpPr>
+        <p:spPr/>
+        <p:txBody>
+          <a:bodyPr/>
+          <a:lstStyle/>
+          <a:p>
+            <a:endParaRPr lang="pt-BR"/>
+          </a:p>
+        </p:txBody>
+      </p:sp>
+      <p:sp>
+        <p:nvSpPr>
+          <p:cNvPr id="4" name="Espaço Reservado para Número de Slide 3"/>
+          <p:cNvSpPr>
+            <a:spLocks noGrp="1"/>
+          </p:cNvSpPr>
+          <p:nvPr>
+            <p:ph type="sldNum" sz="quarter" idx="5"/>
+          </p:nvPr>
+        </p:nvSpPr>
+        <p:spPr/>
+        <p:txBody>
+          <a:bodyPr/>
+          <a:lstStyle/>
+          <a:p>
+            <a:pPr rtl="0"/>
+            <a:fld id="{5E8C15C5-0688-5345-99FC-721E08AD15D5}" type="slidenum">
+              <a:rPr lang="pt-BR" noProof="0" smtClean="0"/>
+              <a:t>29</a:t>
+            </a:fld>
+            <a:endParaRPr lang="pt-BR" noProof="0"/>
+          </a:p>
+        </p:txBody>
+      </p:sp>
+    </p:spTree>
+    <p:extLst>
+      <p:ext uri="{BB962C8B-B14F-4D97-AF65-F5344CB8AC3E}">
         <p14:creationId xmlns:p14="http://schemas.microsoft.com/office/powerpoint/2010/main" val="1909827659"/>
       </p:ext>
     </p:extLst>
@@ -19084,7 +20490,7 @@
             <a:pPr rtl="0"/>
             <a:fld id="{D343513E-46B4-41B7-80A1-DD9EF3DE51F5}" type="datetime1">
               <a:rPr lang="pt-BR" noProof="0" smtClean="0"/>
-              <a:t>08/11/2020</a:t>
+              <a:t>09/11/2020</a:t>
             </a:fld>
             <a:endParaRPr lang="pt-BR" noProof="0"/>
           </a:p>
@@ -19379,7 +20785,7 @@
             <a:pPr rtl="0"/>
             <a:fld id="{712D2201-4C1B-4E0F-9A6A-4B2ABD1B981E}" type="datetime1">
               <a:rPr lang="pt-BR" noProof="0" smtClean="0"/>
-              <a:t>08/11/2020</a:t>
+              <a:t>09/11/2020</a:t>
             </a:fld>
             <a:endParaRPr lang="pt-BR" noProof="0"/>
           </a:p>
@@ -19631,7 +21037,7 @@
             <a:pPr rtl="0"/>
             <a:fld id="{75CE7F81-9FDF-4859-91A7-D79DFBC27513}" type="datetime1">
               <a:rPr lang="pt-BR" noProof="0" smtClean="0"/>
-              <a:t>08/11/2020</a:t>
+              <a:t>09/11/2020</a:t>
             </a:fld>
             <a:endParaRPr lang="pt-BR" noProof="0"/>
           </a:p>
@@ -20171,7 +21577,7 @@
             <a:pPr rtl="0"/>
             <a:fld id="{2EE1412C-EC0E-485E-B434-D383B52A65FC}" type="datetime1">
               <a:rPr lang="pt-BR" noProof="0" smtClean="0"/>
-              <a:t>08/11/2020</a:t>
+              <a:t>09/11/2020</a:t>
             </a:fld>
             <a:endParaRPr lang="pt-BR" noProof="0"/>
           </a:p>
@@ -20423,7 +21829,7 @@
             <a:pPr rtl="0"/>
             <a:fld id="{9EFD6A31-5041-4A9B-B795-C75043416663}" type="datetime1">
               <a:rPr lang="pt-BR" noProof="0" smtClean="0"/>
-              <a:t>08/11/2020</a:t>
+              <a:t>09/11/2020</a:t>
             </a:fld>
             <a:endParaRPr lang="pt-BR" noProof="0"/>
           </a:p>
@@ -20970,7 +22376,7 @@
             <a:pPr rtl="0"/>
             <a:fld id="{A9890193-D901-48C1-90D4-08534B566750}" type="datetime1">
               <a:rPr lang="pt-BR" noProof="0" smtClean="0"/>
-              <a:t>08/11/2020</a:t>
+              <a:t>09/11/2020</a:t>
             </a:fld>
             <a:endParaRPr lang="pt-BR" noProof="0"/>
           </a:p>
@@ -21283,7 +22689,7 @@
             <a:pPr rtl="0"/>
             <a:fld id="{9F723DAE-AD2D-49DC-911C-FD1F625E2A18}" type="datetime1">
               <a:rPr lang="pt-BR" noProof="0" smtClean="0"/>
-              <a:t>08/11/2020</a:t>
+              <a:t>09/11/2020</a:t>
             </a:fld>
             <a:endParaRPr lang="pt-BR" noProof="0"/>
           </a:p>
@@ -21461,7 +22867,7 @@
             <a:pPr rtl="0"/>
             <a:fld id="{AAE1798B-D438-4BE9-95FA-621F2B48C899}" type="datetime1">
               <a:rPr lang="pt-BR" noProof="0" smtClean="0"/>
-              <a:t>08/11/2020</a:t>
+              <a:t>09/11/2020</a:t>
             </a:fld>
             <a:endParaRPr lang="pt-BR" noProof="0"/>
           </a:p>
@@ -21644,7 +23050,7 @@
             <a:pPr rtl="0"/>
             <a:fld id="{B4F6A6FE-EC72-4772-9CB9-723DE28367A2}" type="datetime1">
               <a:rPr lang="pt-BR" noProof="0" smtClean="0"/>
-              <a:t>08/11/2020</a:t>
+              <a:t>09/11/2020</a:t>
             </a:fld>
             <a:endParaRPr lang="pt-BR" noProof="0"/>
           </a:p>
@@ -21817,7 +23223,7 @@
             <a:pPr rtl="0"/>
             <a:fld id="{8655A469-83CC-43DF-90B0-EE294789D2A2}" type="datetime1">
               <a:rPr lang="pt-BR" noProof="0" smtClean="0"/>
-              <a:t>08/11/2020</a:t>
+              <a:t>09/11/2020</a:t>
             </a:fld>
             <a:endParaRPr lang="pt-BR" noProof="0"/>
           </a:p>
@@ -22067,7 +23473,7 @@
             <a:pPr rtl="0"/>
             <a:fld id="{9424F34E-4845-4DD5-8CE6-630A1AF19533}" type="datetime1">
               <a:rPr lang="pt-BR" noProof="0" smtClean="0"/>
-              <a:t>08/11/2020</a:t>
+              <a:t>09/11/2020</a:t>
             </a:fld>
             <a:endParaRPr lang="pt-BR" noProof="0"/>
           </a:p>
@@ -22361,7 +23767,7 @@
             <a:pPr rtl="0"/>
             <a:fld id="{840F3513-2A78-4A99-B55B-924559B2CC88}" type="datetime1">
               <a:rPr lang="pt-BR" noProof="0" smtClean="0"/>
-              <a:t>08/11/2020</a:t>
+              <a:t>09/11/2020</a:t>
             </a:fld>
             <a:endParaRPr lang="pt-BR" noProof="0"/>
           </a:p>
@@ -22793,7 +24199,7 @@
             <a:pPr rtl="0"/>
             <a:fld id="{7AAD645B-A335-45B7-B49B-905ED7C4BE9C}" type="datetime1">
               <a:rPr lang="pt-BR" noProof="0" smtClean="0"/>
-              <a:t>08/11/2020</a:t>
+              <a:t>09/11/2020</a:t>
             </a:fld>
             <a:endParaRPr lang="pt-BR" noProof="0"/>
           </a:p>
@@ -22920,7 +24326,7 @@
             <a:pPr rtl="0"/>
             <a:fld id="{D1288135-4108-43B7-AB0C-AA06D13AE817}" type="datetime1">
               <a:rPr lang="pt-BR" noProof="0" smtClean="0"/>
-              <a:t>08/11/2020</a:t>
+              <a:t>09/11/2020</a:t>
             </a:fld>
             <a:endParaRPr lang="pt-BR" noProof="0"/>
           </a:p>
@@ -23019,7 +24425,7 @@
             <a:pPr rtl="0"/>
             <a:fld id="{445BF541-ACC3-4EAD-937C-85AB65D6F6EB}" type="datetime1">
               <a:rPr lang="pt-BR" noProof="0" smtClean="0"/>
-              <a:t>08/11/2020</a:t>
+              <a:t>09/11/2020</a:t>
             </a:fld>
             <a:endParaRPr lang="pt-BR" noProof="0"/>
           </a:p>
@@ -23305,7 +24711,7 @@
             <a:pPr rtl="0"/>
             <a:fld id="{81075FDC-A06E-4B50-A51A-6BED0C2E272D}" type="datetime1">
               <a:rPr lang="pt-BR" noProof="0" smtClean="0"/>
-              <a:t>08/11/2020</a:t>
+              <a:t>09/11/2020</a:t>
             </a:fld>
             <a:endParaRPr lang="pt-BR" noProof="0"/>
           </a:p>
@@ -23600,7 +25006,7 @@
             <a:pPr rtl="0"/>
             <a:fld id="{73E0EBDC-7BF4-4AEC-AC6A-7FA9B0CE63B8}" type="datetime1">
               <a:rPr lang="pt-BR" noProof="0" smtClean="0"/>
-              <a:t>08/11/2020</a:t>
+              <a:t>09/11/2020</a:t>
             </a:fld>
             <a:endParaRPr lang="pt-BR" noProof="0"/>
           </a:p>
@@ -23834,7 +25240,7 @@
             <a:pPr rtl="0"/>
             <a:fld id="{3DFD0AFC-54B6-4178-93EC-38CF8331AA84}" type="datetime1">
               <a:rPr lang="pt-BR" noProof="0" smtClean="0"/>
-              <a:t>08/11/2020</a:t>
+              <a:t>09/11/2020</a:t>
             </a:fld>
             <a:endParaRPr lang="pt-BR" noProof="0"/>
           </a:p>
@@ -29314,7 +30720,7 @@
             <p:ph idx="1"/>
             <p:extLst>
               <p:ext uri="{D42A27DB-BD31-4B8C-83A1-F6EECF244321}">
-                <p14:modId xmlns:p14="http://schemas.microsoft.com/office/powerpoint/2010/main" val="2434692791"/>
+                <p14:modId xmlns:p14="http://schemas.microsoft.com/office/powerpoint/2010/main" val="1173608807"/>
               </p:ext>
             </p:extLst>
           </p:nvPr>
@@ -32022,7 +33428,7 @@
             <a:pPr algn="ctr"/>
             <a:r>
               <a:rPr lang="pt-BR" noProof="0" dirty="0"/>
-              <a:t>Interação com teclado numérico e display LCD</a:t>
+              <a:t>Operações básicas e complexas</a:t>
             </a:r>
             <a:br>
               <a:rPr lang="pt-BR" noProof="0" dirty="0"/>
@@ -32054,13 +33460,8 @@
           <a:p>
             <a:r>
               <a:rPr lang="pt-BR" dirty="0"/>
-              <a:t>Rotinas relacionadas ao armazenamento dos números e da sua apresentação no display </a:t>
+              <a:t>Rotinas relacionadas as 4 operações básicas e a 3 operações complexas</a:t>
             </a:r>
-            <a:r>
-              <a:rPr lang="pt-BR" dirty="0" err="1"/>
-              <a:t>lcd</a:t>
-            </a:r>
-            <a:endParaRPr lang="pt-BR" dirty="0"/>
           </a:p>
         </p:txBody>
       </p:sp>
@@ -32078,6 +33479,1151 @@
 </file>
 
 <file path=ppt/slides/slide27.xml><?xml version="1.0" encoding="utf-8"?>
+<p:sld xmlns:a="http://schemas.openxmlformats.org/drawingml/2006/main" xmlns:r="http://schemas.openxmlformats.org/officeDocument/2006/relationships" xmlns:p="http://schemas.openxmlformats.org/presentationml/2006/main">
+  <p:cSld>
+    <p:bg>
+      <p:bgPr>
+        <a:blipFill rotWithShape="1">
+          <a:blip r:embed="rId3">
+            <a:duotone>
+              <a:schemeClr val="bg2">
+                <a:shade val="28000"/>
+                <a:satMod val="94000"/>
+                <a:lumMod val="20000"/>
+              </a:schemeClr>
+              <a:schemeClr val="bg2">
+                <a:tint val="94000"/>
+                <a:shade val="84000"/>
+                <a:satMod val="148000"/>
+                <a:lumMod val="114000"/>
+              </a:schemeClr>
+            </a:duotone>
+          </a:blip>
+          <a:stretch/>
+        </a:blipFill>
+        <a:effectLst/>
+      </p:bgPr>
+    </p:bg>
+    <p:spTree>
+      <p:nvGrpSpPr>
+        <p:cNvPr id="1" name=""/>
+        <p:cNvGrpSpPr/>
+        <p:nvPr/>
+      </p:nvGrpSpPr>
+      <p:grpSpPr>
+        <a:xfrm>
+          <a:off x="0" y="0"/>
+          <a:ext cx="0" cy="0"/>
+          <a:chOff x="0" y="0"/>
+          <a:chExt cx="0" cy="0"/>
+        </a:xfrm>
+      </p:grpSpPr>
+      <p:sp>
+        <p:nvSpPr>
+          <p:cNvPr id="2" name="Título 1">
+            <a:extLst>
+              <a:ext uri="{FF2B5EF4-FFF2-40B4-BE49-F238E27FC236}">
+                <a16:creationId xmlns:a16="http://schemas.microsoft.com/office/drawing/2014/main" id="{5F3F6C66-D6D7-4A72-9928-967AEA400766}"/>
+              </a:ext>
+            </a:extLst>
+          </p:cNvPr>
+          <p:cNvSpPr>
+            <a:spLocks noGrp="1"/>
+          </p:cNvSpPr>
+          <p:nvPr>
+            <p:ph type="title"/>
+          </p:nvPr>
+        </p:nvSpPr>
+        <p:spPr>
+          <a:xfrm>
+            <a:off x="8119869" y="643466"/>
+            <a:ext cx="3143875" cy="5571065"/>
+          </a:xfrm>
+        </p:spPr>
+        <p:txBody>
+          <a:bodyPr rtlCol="0" anchor="ctr">
+            <a:normAutofit/>
+          </a:bodyPr>
+          <a:lstStyle/>
+          <a:p>
+            <a:pPr algn="ctr" rtl="0"/>
+            <a:r>
+              <a:rPr lang="pt-BR" sz="3600" b="1" dirty="0"/>
+              <a:t>Operações</a:t>
+            </a:r>
+          </a:p>
+        </p:txBody>
+      </p:sp>
+      <p:sp>
+        <p:nvSpPr>
+          <p:cNvPr id="11" name="Retângulo 10">
+            <a:extLst>
+              <a:ext uri="{FF2B5EF4-FFF2-40B4-BE49-F238E27FC236}">
+                <a16:creationId xmlns:a16="http://schemas.microsoft.com/office/drawing/2014/main" id="{8FBC750A-B8E7-49A0-A00A-F72451271B57}"/>
+              </a:ext>
+              <a:ext uri="{C183D7F6-B498-43B3-948B-1728B52AA6E4}">
+                <adec:decorative xmlns:adec="http://schemas.microsoft.com/office/drawing/2017/decorative" val="1"/>
+              </a:ext>
+            </a:extLst>
+          </p:cNvPr>
+          <p:cNvSpPr>
+            <a:spLocks noGrp="1" noRot="1" noChangeAspect="1" noMove="1" noResize="1" noEditPoints="1" noAdjustHandles="1" noChangeArrowheads="1" noChangeShapeType="1" noTextEdit="1"/>
+          </p:cNvSpPr>
+          <p:nvPr>
+            <p:extLst>
+              <p:ext uri="{386F3935-93C4-4BCD-93E2-E3B085C9AB24}">
+                <p16:designElem xmlns:p16="http://schemas.microsoft.com/office/powerpoint/2015/main" val="1"/>
+              </p:ext>
+            </p:extLst>
+          </p:nvPr>
+        </p:nvSpPr>
+        <p:spPr>
+          <a:xfrm>
+            <a:off x="0" y="0"/>
+            <a:ext cx="7532169" cy="6858000"/>
+          </a:xfrm>
+          <a:prstGeom prst="rect">
+            <a:avLst/>
+          </a:prstGeom>
+          <a:solidFill>
+            <a:schemeClr val="bg2"/>
+          </a:solidFill>
+          <a:ln>
+            <a:noFill/>
+          </a:ln>
+          <a:effectLst/>
+        </p:spPr>
+        <p:style>
+          <a:lnRef idx="2">
+            <a:schemeClr val="accent1">
+              <a:shade val="50000"/>
+            </a:schemeClr>
+          </a:lnRef>
+          <a:fillRef idx="1">
+            <a:schemeClr val="accent1"/>
+          </a:fillRef>
+          <a:effectRef idx="0">
+            <a:schemeClr val="accent1"/>
+          </a:effectRef>
+          <a:fontRef idx="minor">
+            <a:schemeClr val="lt1"/>
+          </a:fontRef>
+        </p:style>
+        <p:txBody>
+          <a:bodyPr rtlCol="0" anchor="ctr"/>
+          <a:lstStyle/>
+          <a:p>
+            <a:pPr algn="ctr" rtl="0"/>
+            <a:endParaRPr lang="pt-BR" dirty="0"/>
+          </a:p>
+        </p:txBody>
+      </p:sp>
+      <p:sp>
+        <p:nvSpPr>
+          <p:cNvPr id="13" name="Retângulo 12">
+            <a:extLst>
+              <a:ext uri="{FF2B5EF4-FFF2-40B4-BE49-F238E27FC236}">
+                <a16:creationId xmlns:a16="http://schemas.microsoft.com/office/drawing/2014/main" id="{544D0436-4FAC-43D1-9565-515BBE80D7C2}"/>
+              </a:ext>
+              <a:ext uri="{C183D7F6-B498-43B3-948B-1728B52AA6E4}">
+                <adec:decorative xmlns:adec="http://schemas.microsoft.com/office/drawing/2017/decorative" val="1"/>
+              </a:ext>
+            </a:extLst>
+          </p:cNvPr>
+          <p:cNvSpPr>
+            <a:spLocks noGrp="1" noRot="1" noChangeAspect="1" noMove="1" noResize="1" noEditPoints="1" noAdjustHandles="1" noChangeArrowheads="1" noChangeShapeType="1" noTextEdit="1"/>
+          </p:cNvSpPr>
+          <p:nvPr>
+            <p:extLst>
+              <p:ext uri="{386F3935-93C4-4BCD-93E2-E3B085C9AB24}">
+                <p16:designElem xmlns:p16="http://schemas.microsoft.com/office/powerpoint/2015/main" val="1"/>
+              </p:ext>
+            </p:extLst>
+          </p:nvPr>
+        </p:nvSpPr>
+        <p:spPr>
+          <a:xfrm rot="16200000">
+            <a:off x="3908066" y="3195797"/>
+            <a:ext cx="6858000" cy="466406"/>
+          </a:xfrm>
+          <a:prstGeom prst="rect">
+            <a:avLst/>
+          </a:prstGeom>
+          <a:gradFill>
+            <a:gsLst>
+              <a:gs pos="0">
+                <a:srgbClr val="363D46">
+                  <a:alpha val="0"/>
+                </a:srgbClr>
+              </a:gs>
+              <a:gs pos="100000">
+                <a:srgbClr val="363D46">
+                  <a:lumMod val="75000"/>
+                </a:srgbClr>
+              </a:gs>
+            </a:gsLst>
+            <a:lin ang="5400000" scaled="0"/>
+          </a:gradFill>
+          <a:ln>
+            <a:noFill/>
+          </a:ln>
+          <a:effectLst/>
+        </p:spPr>
+        <p:style>
+          <a:lnRef idx="2">
+            <a:schemeClr val="accent1">
+              <a:shade val="50000"/>
+            </a:schemeClr>
+          </a:lnRef>
+          <a:fillRef idx="1">
+            <a:schemeClr val="accent1"/>
+          </a:fillRef>
+          <a:effectRef idx="0">
+            <a:schemeClr val="accent1"/>
+          </a:effectRef>
+          <a:fontRef idx="minor">
+            <a:schemeClr val="lt1"/>
+          </a:fontRef>
+        </p:style>
+        <p:txBody>
+          <a:bodyPr rot="0" spcFirstLastPara="0" vertOverflow="overflow" horzOverflow="overflow" vert="horz" wrap="square" lIns="91440" tIns="45720" rIns="91440" bIns="45720" numCol="1" spcCol="0" rtlCol="0" fromWordArt="0" anchor="ctr" anchorCtr="0" forceAA="0" compatLnSpc="1">
+            <a:prstTxWarp prst="textNoShape">
+              <a:avLst/>
+            </a:prstTxWarp>
+            <a:noAutofit/>
+          </a:bodyPr>
+          <a:lstStyle/>
+          <a:p>
+            <a:pPr algn="ctr" rtl="0"/>
+            <a:endParaRPr lang="pt-BR" dirty="0"/>
+          </a:p>
+        </p:txBody>
+      </p:sp>
+      <p:cxnSp>
+        <p:nvCxnSpPr>
+          <p:cNvPr id="15" name="Conector Reto 14">
+            <a:extLst>
+              <a:ext uri="{FF2B5EF4-FFF2-40B4-BE49-F238E27FC236}">
+                <a16:creationId xmlns:a16="http://schemas.microsoft.com/office/drawing/2014/main" id="{9F82E424-AAF6-43AC-AC56-03BA23E0C938}"/>
+              </a:ext>
+              <a:ext uri="{C183D7F6-B498-43B3-948B-1728B52AA6E4}">
+                <adec:decorative xmlns:adec="http://schemas.microsoft.com/office/drawing/2017/decorative" val="1"/>
+              </a:ext>
+            </a:extLst>
+          </p:cNvPr>
+          <p:cNvCxnSpPr>
+            <a:cxnSpLocks noGrp="1" noRot="1" noChangeAspect="1" noMove="1" noResize="1" noEditPoints="1" noAdjustHandles="1" noChangeArrowheads="1" noChangeShapeType="1"/>
+          </p:cNvCxnSpPr>
+          <p:nvPr>
+            <p:extLst>
+              <p:ext uri="{386F3935-93C4-4BCD-93E2-E3B085C9AB24}">
+                <p16:designElem xmlns:p16="http://schemas.microsoft.com/office/powerpoint/2015/main" val="1"/>
+              </p:ext>
+            </p:extLst>
+          </p:nvPr>
+        </p:nvCxnSpPr>
+        <p:spPr>
+          <a:xfrm rot="5400000">
+            <a:off x="4150420" y="3429000"/>
+            <a:ext cx="6858000" cy="0"/>
+          </a:xfrm>
+          <a:prstGeom prst="line">
+            <a:avLst/>
+          </a:prstGeom>
+          <a:solidFill>
+            <a:srgbClr val="FFFFFF"/>
+          </a:solidFill>
+          <a:ln w="38100" cap="flat">
+            <a:gradFill flip="none" rotWithShape="1">
+              <a:gsLst>
+                <a:gs pos="0">
+                  <a:srgbClr val="363D46"/>
+                </a:gs>
+                <a:gs pos="100000">
+                  <a:srgbClr val="363D46">
+                    <a:lumMod val="75000"/>
+                  </a:srgbClr>
+                </a:gs>
+              </a:gsLst>
+              <a:lin ang="5400000" scaled="0"/>
+              <a:tileRect/>
+            </a:gradFill>
+            <a:miter lim="800000"/>
+          </a:ln>
+          <a:effectLst>
+            <a:innerShdw blurRad="57150" dist="38100" dir="14460000">
+              <a:srgbClr val="000000">
+                <a:alpha val="70000"/>
+              </a:srgbClr>
+            </a:innerShdw>
+          </a:effectLst>
+        </p:spPr>
+        <p:style>
+          <a:lnRef idx="2">
+            <a:schemeClr val="accent1">
+              <a:shade val="50000"/>
+            </a:schemeClr>
+          </a:lnRef>
+          <a:fillRef idx="1">
+            <a:schemeClr val="accent1"/>
+          </a:fillRef>
+          <a:effectRef idx="0">
+            <a:schemeClr val="accent1"/>
+          </a:effectRef>
+          <a:fontRef idx="minor">
+            <a:schemeClr val="lt1"/>
+          </a:fontRef>
+        </p:style>
+      </p:cxnSp>
+      <p:graphicFrame>
+        <p:nvGraphicFramePr>
+          <p:cNvPr id="6" name="Espaço Reservado para Conteúdo 5" descr="espaço reservado para gráfico">
+            <a:extLst>
+              <a:ext uri="{FF2B5EF4-FFF2-40B4-BE49-F238E27FC236}">
+                <a16:creationId xmlns:a16="http://schemas.microsoft.com/office/drawing/2014/main" id="{4F8339CB-596F-46C7-A612-EA1CB5750EDB}"/>
+              </a:ext>
+            </a:extLst>
+          </p:cNvPr>
+          <p:cNvGraphicFramePr>
+            <a:graphicFrameLocks noGrp="1"/>
+          </p:cNvGraphicFramePr>
+          <p:nvPr>
+            <p:ph idx="1"/>
+          </p:nvPr>
+        </p:nvGraphicFramePr>
+        <p:xfrm>
+          <a:off x="839622" y="643465"/>
+          <a:ext cx="6243992" cy="5571065"/>
+        </p:xfrm>
+        <a:graphic>
+          <a:graphicData uri="http://schemas.openxmlformats.org/drawingml/2006/chart">
+            <c:chart xmlns:c="http://schemas.openxmlformats.org/drawingml/2006/chart" xmlns:r="http://schemas.openxmlformats.org/officeDocument/2006/relationships" r:id="rId4"/>
+          </a:graphicData>
+        </a:graphic>
+      </p:graphicFrame>
+      <p:sp>
+        <p:nvSpPr>
+          <p:cNvPr id="3" name="CaixaDeTexto 2">
+            <a:extLst>
+              <a:ext uri="{FF2B5EF4-FFF2-40B4-BE49-F238E27FC236}">
+                <a16:creationId xmlns:a16="http://schemas.microsoft.com/office/drawing/2014/main" id="{E1F3E5DC-0DE5-4065-BA9A-3D5B065CC523}"/>
+              </a:ext>
+            </a:extLst>
+          </p:cNvPr>
+          <p:cNvSpPr txBox="1"/>
+          <p:nvPr/>
+        </p:nvSpPr>
+        <p:spPr>
+          <a:xfrm>
+            <a:off x="1182278" y="1582337"/>
+            <a:ext cx="5557422" cy="3693319"/>
+          </a:xfrm>
+          <a:prstGeom prst="rect">
+            <a:avLst/>
+          </a:prstGeom>
+          <a:noFill/>
+        </p:spPr>
+        <p:txBody>
+          <a:bodyPr wrap="square" rtlCol="0">
+            <a:spAutoFit/>
+          </a:bodyPr>
+          <a:lstStyle/>
+          <a:p>
+            <a:r>
+              <a:rPr lang="pt-BR" dirty="0"/>
+              <a:t>Básicas:</a:t>
+            </a:r>
+          </a:p>
+          <a:p>
+            <a:endParaRPr lang="pt-BR" dirty="0"/>
+          </a:p>
+          <a:p>
+            <a:pPr marL="742950" lvl="1" indent="-285750">
+              <a:buFont typeface="Arial" panose="020B0604020202020204" pitchFamily="34" charset="0"/>
+              <a:buChar char="•"/>
+            </a:pPr>
+            <a:r>
+              <a:rPr lang="pt-BR" dirty="0"/>
+              <a:t>Adição</a:t>
+            </a:r>
+          </a:p>
+          <a:p>
+            <a:pPr marL="742950" lvl="1" indent="-285750">
+              <a:buFont typeface="Arial" panose="020B0604020202020204" pitchFamily="34" charset="0"/>
+              <a:buChar char="•"/>
+            </a:pPr>
+            <a:r>
+              <a:rPr lang="pt-BR" dirty="0"/>
+              <a:t>Subtração</a:t>
+            </a:r>
+          </a:p>
+          <a:p>
+            <a:pPr marL="742950" lvl="1" indent="-285750">
+              <a:buFont typeface="Arial" panose="020B0604020202020204" pitchFamily="34" charset="0"/>
+              <a:buChar char="•"/>
+            </a:pPr>
+            <a:r>
+              <a:rPr lang="pt-BR" dirty="0"/>
+              <a:t>Multiplicação</a:t>
+            </a:r>
+          </a:p>
+          <a:p>
+            <a:pPr marL="742950" lvl="1" indent="-285750">
+              <a:buFont typeface="Arial" panose="020B0604020202020204" pitchFamily="34" charset="0"/>
+              <a:buChar char="•"/>
+            </a:pPr>
+            <a:r>
+              <a:rPr lang="pt-BR" dirty="0"/>
+              <a:t>Divisão</a:t>
+            </a:r>
+          </a:p>
+          <a:p>
+            <a:pPr lvl="1"/>
+            <a:endParaRPr lang="pt-BR" dirty="0"/>
+          </a:p>
+          <a:p>
+            <a:endParaRPr lang="pt-BR" dirty="0"/>
+          </a:p>
+          <a:p>
+            <a:r>
+              <a:rPr lang="pt-BR" dirty="0"/>
+              <a:t>Complexas:</a:t>
+            </a:r>
+          </a:p>
+          <a:p>
+            <a:endParaRPr lang="pt-BR" dirty="0"/>
+          </a:p>
+          <a:p>
+            <a:pPr marL="742950" lvl="1" indent="-285750">
+              <a:buFont typeface="Arial" panose="020B0604020202020204" pitchFamily="34" charset="0"/>
+              <a:buChar char="•"/>
+            </a:pPr>
+            <a:r>
+              <a:rPr lang="pt-BR" dirty="0"/>
+              <a:t>Potenciação</a:t>
+            </a:r>
+          </a:p>
+          <a:p>
+            <a:pPr marL="742950" lvl="1" indent="-285750">
+              <a:buFont typeface="Arial" panose="020B0604020202020204" pitchFamily="34" charset="0"/>
+              <a:buChar char="•"/>
+            </a:pPr>
+            <a:r>
+              <a:rPr lang="pt-BR" dirty="0"/>
+              <a:t>Radiciação</a:t>
+            </a:r>
+          </a:p>
+          <a:p>
+            <a:pPr marL="742950" lvl="1" indent="-285750">
+              <a:buFont typeface="Arial" panose="020B0604020202020204" pitchFamily="34" charset="0"/>
+              <a:buChar char="•"/>
+            </a:pPr>
+            <a:r>
+              <a:rPr lang="pt-BR" dirty="0"/>
+              <a:t>Logaritmo na base 10	</a:t>
+            </a:r>
+          </a:p>
+        </p:txBody>
+      </p:sp>
+      <p:pic>
+        <p:nvPicPr>
+          <p:cNvPr id="7" name="Gráfico 6" descr="Marca de seleção">
+            <a:extLst>
+              <a:ext uri="{FF2B5EF4-FFF2-40B4-BE49-F238E27FC236}">
+                <a16:creationId xmlns:a16="http://schemas.microsoft.com/office/drawing/2014/main" id="{73EB1405-3BD0-4538-8183-B80EC4EDE8E9}"/>
+              </a:ext>
+            </a:extLst>
+          </p:cNvPr>
+          <p:cNvPicPr>
+            <a:picLocks noChangeAspect="1"/>
+          </p:cNvPicPr>
+          <p:nvPr/>
+        </p:nvPicPr>
+        <p:blipFill>
+          <a:blip r:embed="rId5">
+            <a:extLst>
+              <a:ext uri="{96DAC541-7B7A-43D3-8B79-37D633B846F1}">
+                <asvg:svgBlip xmlns:asvg="http://schemas.microsoft.com/office/drawing/2016/SVG/main" r:embed="rId6"/>
+              </a:ext>
+            </a:extLst>
+          </a:blip>
+          <a:stretch>
+            <a:fillRect/>
+          </a:stretch>
+        </p:blipFill>
+        <p:spPr>
+          <a:xfrm>
+            <a:off x="2929680" y="2203733"/>
+            <a:ext cx="229587" cy="229587"/>
+          </a:xfrm>
+          <a:prstGeom prst="rect">
+            <a:avLst/>
+          </a:prstGeom>
+        </p:spPr>
+      </p:pic>
+      <p:pic>
+        <p:nvPicPr>
+          <p:cNvPr id="8" name="Gráfico 7" descr="Marca de seleção">
+            <a:extLst>
+              <a:ext uri="{FF2B5EF4-FFF2-40B4-BE49-F238E27FC236}">
+                <a16:creationId xmlns:a16="http://schemas.microsoft.com/office/drawing/2014/main" id="{A7184C1B-8B74-4204-B2F2-5643966831BA}"/>
+              </a:ext>
+            </a:extLst>
+          </p:cNvPr>
+          <p:cNvPicPr>
+            <a:picLocks noChangeAspect="1"/>
+          </p:cNvPicPr>
+          <p:nvPr/>
+        </p:nvPicPr>
+        <p:blipFill>
+          <a:blip r:embed="rId5">
+            <a:extLst>
+              <a:ext uri="{96DAC541-7B7A-43D3-8B79-37D633B846F1}">
+                <asvg:svgBlip xmlns:asvg="http://schemas.microsoft.com/office/drawing/2016/SVG/main" r:embed="rId6"/>
+              </a:ext>
+            </a:extLst>
+          </a:blip>
+          <a:stretch>
+            <a:fillRect/>
+          </a:stretch>
+        </p:blipFill>
+        <p:spPr>
+          <a:xfrm>
+            <a:off x="3207551" y="2478053"/>
+            <a:ext cx="229587" cy="229587"/>
+          </a:xfrm>
+          <a:prstGeom prst="rect">
+            <a:avLst/>
+          </a:prstGeom>
+        </p:spPr>
+      </p:pic>
+      <p:pic>
+        <p:nvPicPr>
+          <p:cNvPr id="10" name="Gráfico 9" descr="Fechar">
+            <a:extLst>
+              <a:ext uri="{FF2B5EF4-FFF2-40B4-BE49-F238E27FC236}">
+                <a16:creationId xmlns:a16="http://schemas.microsoft.com/office/drawing/2014/main" id="{86BEE014-9479-440D-872B-563A6CD1B464}"/>
+              </a:ext>
+            </a:extLst>
+          </p:cNvPr>
+          <p:cNvPicPr>
+            <a:picLocks noChangeAspect="1"/>
+          </p:cNvPicPr>
+          <p:nvPr/>
+        </p:nvPicPr>
+        <p:blipFill>
+          <a:blip r:embed="rId7">
+            <a:extLst>
+              <a:ext uri="{96DAC541-7B7A-43D3-8B79-37D633B846F1}">
+                <asvg:svgBlip xmlns:asvg="http://schemas.microsoft.com/office/drawing/2016/SVG/main" r:embed="rId8"/>
+              </a:ext>
+            </a:extLst>
+          </a:blip>
+          <a:stretch>
+            <a:fillRect/>
+          </a:stretch>
+        </p:blipFill>
+        <p:spPr>
+          <a:xfrm>
+            <a:off x="3581400" y="2778760"/>
+            <a:ext cx="243840" cy="243840"/>
+          </a:xfrm>
+          <a:prstGeom prst="rect">
+            <a:avLst/>
+          </a:prstGeom>
+        </p:spPr>
+      </p:pic>
+      <p:pic>
+        <p:nvPicPr>
+          <p:cNvPr id="14" name="Gráfico 13" descr="Fechar">
+            <a:extLst>
+              <a:ext uri="{FF2B5EF4-FFF2-40B4-BE49-F238E27FC236}">
+                <a16:creationId xmlns:a16="http://schemas.microsoft.com/office/drawing/2014/main" id="{D9E029D1-FE05-44EC-9A1A-C0E80D2395C4}"/>
+              </a:ext>
+            </a:extLst>
+          </p:cNvPr>
+          <p:cNvPicPr>
+            <a:picLocks noChangeAspect="1"/>
+          </p:cNvPicPr>
+          <p:nvPr/>
+        </p:nvPicPr>
+        <p:blipFill>
+          <a:blip r:embed="rId7">
+            <a:extLst>
+              <a:ext uri="{96DAC541-7B7A-43D3-8B79-37D633B846F1}">
+                <asvg:svgBlip xmlns:asvg="http://schemas.microsoft.com/office/drawing/2016/SVG/main" r:embed="rId8"/>
+              </a:ext>
+            </a:extLst>
+          </a:blip>
+          <a:stretch>
+            <a:fillRect/>
+          </a:stretch>
+        </p:blipFill>
+        <p:spPr>
+          <a:xfrm>
+            <a:off x="2807760" y="3022600"/>
+            <a:ext cx="243840" cy="243840"/>
+          </a:xfrm>
+          <a:prstGeom prst="rect">
+            <a:avLst/>
+          </a:prstGeom>
+        </p:spPr>
+      </p:pic>
+      <p:pic>
+        <p:nvPicPr>
+          <p:cNvPr id="18" name="Gráfico 17" descr="Fechar">
+            <a:extLst>
+              <a:ext uri="{FF2B5EF4-FFF2-40B4-BE49-F238E27FC236}">
+                <a16:creationId xmlns:a16="http://schemas.microsoft.com/office/drawing/2014/main" id="{B2E1E97A-22E8-49D4-8A56-0461C86BC857}"/>
+              </a:ext>
+            </a:extLst>
+          </p:cNvPr>
+          <p:cNvPicPr>
+            <a:picLocks noChangeAspect="1"/>
+          </p:cNvPicPr>
+          <p:nvPr/>
+        </p:nvPicPr>
+        <p:blipFill>
+          <a:blip r:embed="rId7">
+            <a:extLst>
+              <a:ext uri="{96DAC541-7B7A-43D3-8B79-37D633B846F1}">
+                <asvg:svgBlip xmlns:asvg="http://schemas.microsoft.com/office/drawing/2016/SVG/main" r:embed="rId8"/>
+              </a:ext>
+            </a:extLst>
+          </a:blip>
+          <a:stretch>
+            <a:fillRect/>
+          </a:stretch>
+        </p:blipFill>
+        <p:spPr>
+          <a:xfrm>
+            <a:off x="3489960" y="4409440"/>
+            <a:ext cx="243840" cy="243840"/>
+          </a:xfrm>
+          <a:prstGeom prst="rect">
+            <a:avLst/>
+          </a:prstGeom>
+        </p:spPr>
+      </p:pic>
+      <p:pic>
+        <p:nvPicPr>
+          <p:cNvPr id="24" name="Gráfico 23" descr="Fechar">
+            <a:extLst>
+              <a:ext uri="{FF2B5EF4-FFF2-40B4-BE49-F238E27FC236}">
+                <a16:creationId xmlns:a16="http://schemas.microsoft.com/office/drawing/2014/main" id="{6BEB1ACD-D129-42A5-8634-5BF5BC5AD512}"/>
+              </a:ext>
+            </a:extLst>
+          </p:cNvPr>
+          <p:cNvPicPr>
+            <a:picLocks noChangeAspect="1"/>
+          </p:cNvPicPr>
+          <p:nvPr/>
+        </p:nvPicPr>
+        <p:blipFill>
+          <a:blip r:embed="rId7">
+            <a:extLst>
+              <a:ext uri="{96DAC541-7B7A-43D3-8B79-37D633B846F1}">
+                <asvg:svgBlip xmlns:asvg="http://schemas.microsoft.com/office/drawing/2016/SVG/main" r:embed="rId8"/>
+              </a:ext>
+            </a:extLst>
+          </a:blip>
+          <a:stretch>
+            <a:fillRect/>
+          </a:stretch>
+        </p:blipFill>
+        <p:spPr>
+          <a:xfrm>
+            <a:off x="3322344" y="4653280"/>
+            <a:ext cx="243840" cy="243840"/>
+          </a:xfrm>
+          <a:prstGeom prst="rect">
+            <a:avLst/>
+          </a:prstGeom>
+        </p:spPr>
+      </p:pic>
+      <p:pic>
+        <p:nvPicPr>
+          <p:cNvPr id="27" name="Gráfico 26" descr="Fechar">
+            <a:extLst>
+              <a:ext uri="{FF2B5EF4-FFF2-40B4-BE49-F238E27FC236}">
+                <a16:creationId xmlns:a16="http://schemas.microsoft.com/office/drawing/2014/main" id="{C67024B9-C1A9-47B4-BCAF-927B4702E97B}"/>
+              </a:ext>
+            </a:extLst>
+          </p:cNvPr>
+          <p:cNvPicPr>
+            <a:picLocks noChangeAspect="1"/>
+          </p:cNvPicPr>
+          <p:nvPr/>
+        </p:nvPicPr>
+        <p:blipFill>
+          <a:blip r:embed="rId7">
+            <a:extLst>
+              <a:ext uri="{96DAC541-7B7A-43D3-8B79-37D633B846F1}">
+                <asvg:svgBlip xmlns:asvg="http://schemas.microsoft.com/office/drawing/2016/SVG/main" r:embed="rId8"/>
+              </a:ext>
+            </a:extLst>
+          </a:blip>
+          <a:stretch>
+            <a:fillRect/>
+          </a:stretch>
+        </p:blipFill>
+        <p:spPr>
+          <a:xfrm>
+            <a:off x="4495824" y="4958080"/>
+            <a:ext cx="243840" cy="243840"/>
+          </a:xfrm>
+          <a:prstGeom prst="rect">
+            <a:avLst/>
+          </a:prstGeom>
+        </p:spPr>
+      </p:pic>
+    </p:spTree>
+    <p:extLst>
+      <p:ext uri="{BB962C8B-B14F-4D97-AF65-F5344CB8AC3E}">
+        <p14:creationId xmlns:p14="http://schemas.microsoft.com/office/powerpoint/2010/main" val="1405003872"/>
+      </p:ext>
+    </p:extLst>
+  </p:cSld>
+  <p:clrMapOvr>
+    <a:masterClrMapping/>
+  </p:clrMapOvr>
+</p:sld>
+</file>
+
+<file path=ppt/slides/slide28.xml><?xml version="1.0" encoding="utf-8"?>
+<p:sld xmlns:a="http://schemas.openxmlformats.org/drawingml/2006/main" xmlns:r="http://schemas.openxmlformats.org/officeDocument/2006/relationships" xmlns:p="http://schemas.openxmlformats.org/presentationml/2006/main">
+  <p:cSld>
+    <p:bg>
+      <p:bgPr>
+        <a:blipFill rotWithShape="1">
+          <a:blip r:embed="rId3">
+            <a:duotone>
+              <a:schemeClr val="bg2">
+                <a:shade val="28000"/>
+                <a:satMod val="94000"/>
+                <a:lumMod val="20000"/>
+              </a:schemeClr>
+              <a:schemeClr val="bg2">
+                <a:tint val="94000"/>
+                <a:shade val="84000"/>
+                <a:satMod val="148000"/>
+                <a:lumMod val="114000"/>
+              </a:schemeClr>
+            </a:duotone>
+          </a:blip>
+          <a:stretch/>
+        </a:blipFill>
+        <a:effectLst/>
+      </p:bgPr>
+    </p:bg>
+    <p:spTree>
+      <p:nvGrpSpPr>
+        <p:cNvPr id="1" name=""/>
+        <p:cNvGrpSpPr/>
+        <p:nvPr/>
+      </p:nvGrpSpPr>
+      <p:grpSpPr>
+        <a:xfrm>
+          <a:off x="0" y="0"/>
+          <a:ext cx="0" cy="0"/>
+          <a:chOff x="0" y="0"/>
+          <a:chExt cx="0" cy="0"/>
+        </a:xfrm>
+      </p:grpSpPr>
+      <p:sp>
+        <p:nvSpPr>
+          <p:cNvPr id="2" name="Título 1">
+            <a:extLst>
+              <a:ext uri="{FF2B5EF4-FFF2-40B4-BE49-F238E27FC236}">
+                <a16:creationId xmlns:a16="http://schemas.microsoft.com/office/drawing/2014/main" id="{5F3F6C66-D6D7-4A72-9928-967AEA400766}"/>
+              </a:ext>
+            </a:extLst>
+          </p:cNvPr>
+          <p:cNvSpPr>
+            <a:spLocks noGrp="1"/>
+          </p:cNvSpPr>
+          <p:nvPr>
+            <p:ph type="title"/>
+          </p:nvPr>
+        </p:nvSpPr>
+        <p:spPr>
+          <a:xfrm>
+            <a:off x="8119869" y="643466"/>
+            <a:ext cx="3143875" cy="5571065"/>
+          </a:xfrm>
+        </p:spPr>
+        <p:txBody>
+          <a:bodyPr rtlCol="0" anchor="ctr">
+            <a:normAutofit/>
+          </a:bodyPr>
+          <a:lstStyle/>
+          <a:p>
+            <a:pPr algn="ctr" rtl="0"/>
+            <a:r>
+              <a:rPr lang="pt-BR" sz="3600" b="1" dirty="0" err="1"/>
+              <a:t>OPerações</a:t>
+            </a:r>
+            <a:br>
+              <a:rPr lang="pt-BR" sz="3600" b="1" dirty="0"/>
+            </a:br>
+            <a:br>
+              <a:rPr lang="pt-BR" sz="3600" b="1" dirty="0"/>
+            </a:br>
+            <a:r>
+              <a:rPr lang="pt-BR" sz="2800" b="1">
+                <a:solidFill>
+                  <a:schemeClr val="tx1"/>
+                </a:solidFill>
+              </a:rPr>
+              <a:t>(Adição)</a:t>
+            </a:r>
+            <a:endParaRPr lang="pt-BR" sz="3600" b="1" dirty="0"/>
+          </a:p>
+        </p:txBody>
+      </p:sp>
+      <p:sp>
+        <p:nvSpPr>
+          <p:cNvPr id="11" name="Retângulo 10">
+            <a:extLst>
+              <a:ext uri="{FF2B5EF4-FFF2-40B4-BE49-F238E27FC236}">
+                <a16:creationId xmlns:a16="http://schemas.microsoft.com/office/drawing/2014/main" id="{8FBC750A-B8E7-49A0-A00A-F72451271B57}"/>
+              </a:ext>
+              <a:ext uri="{C183D7F6-B498-43B3-948B-1728B52AA6E4}">
+                <adec:decorative xmlns:adec="http://schemas.microsoft.com/office/drawing/2017/decorative" val="1"/>
+              </a:ext>
+            </a:extLst>
+          </p:cNvPr>
+          <p:cNvSpPr>
+            <a:spLocks noGrp="1" noRot="1" noChangeAspect="1" noMove="1" noResize="1" noEditPoints="1" noAdjustHandles="1" noChangeArrowheads="1" noChangeShapeType="1" noTextEdit="1"/>
+          </p:cNvSpPr>
+          <p:nvPr>
+            <p:extLst>
+              <p:ext uri="{386F3935-93C4-4BCD-93E2-E3B085C9AB24}">
+                <p16:designElem xmlns:p16="http://schemas.microsoft.com/office/powerpoint/2015/main" val="1"/>
+              </p:ext>
+            </p:extLst>
+          </p:nvPr>
+        </p:nvSpPr>
+        <p:spPr>
+          <a:xfrm>
+            <a:off x="0" y="0"/>
+            <a:ext cx="7532169" cy="6858000"/>
+          </a:xfrm>
+          <a:prstGeom prst="rect">
+            <a:avLst/>
+          </a:prstGeom>
+          <a:solidFill>
+            <a:schemeClr val="bg2"/>
+          </a:solidFill>
+          <a:ln>
+            <a:noFill/>
+          </a:ln>
+          <a:effectLst/>
+        </p:spPr>
+        <p:style>
+          <a:lnRef idx="2">
+            <a:schemeClr val="accent1">
+              <a:shade val="50000"/>
+            </a:schemeClr>
+          </a:lnRef>
+          <a:fillRef idx="1">
+            <a:schemeClr val="accent1"/>
+          </a:fillRef>
+          <a:effectRef idx="0">
+            <a:schemeClr val="accent1"/>
+          </a:effectRef>
+          <a:fontRef idx="minor">
+            <a:schemeClr val="lt1"/>
+          </a:fontRef>
+        </p:style>
+        <p:txBody>
+          <a:bodyPr rtlCol="0" anchor="ctr"/>
+          <a:lstStyle/>
+          <a:p>
+            <a:pPr algn="ctr" rtl="0"/>
+            <a:endParaRPr lang="pt-BR" dirty="0"/>
+          </a:p>
+        </p:txBody>
+      </p:sp>
+      <p:sp>
+        <p:nvSpPr>
+          <p:cNvPr id="13" name="Retângulo 12">
+            <a:extLst>
+              <a:ext uri="{FF2B5EF4-FFF2-40B4-BE49-F238E27FC236}">
+                <a16:creationId xmlns:a16="http://schemas.microsoft.com/office/drawing/2014/main" id="{544D0436-4FAC-43D1-9565-515BBE80D7C2}"/>
+              </a:ext>
+              <a:ext uri="{C183D7F6-B498-43B3-948B-1728B52AA6E4}">
+                <adec:decorative xmlns:adec="http://schemas.microsoft.com/office/drawing/2017/decorative" val="1"/>
+              </a:ext>
+            </a:extLst>
+          </p:cNvPr>
+          <p:cNvSpPr>
+            <a:spLocks noGrp="1" noRot="1" noChangeAspect="1" noMove="1" noResize="1" noEditPoints="1" noAdjustHandles="1" noChangeArrowheads="1" noChangeShapeType="1" noTextEdit="1"/>
+          </p:cNvSpPr>
+          <p:nvPr>
+            <p:extLst>
+              <p:ext uri="{386F3935-93C4-4BCD-93E2-E3B085C9AB24}">
+                <p16:designElem xmlns:p16="http://schemas.microsoft.com/office/powerpoint/2015/main" val="1"/>
+              </p:ext>
+            </p:extLst>
+          </p:nvPr>
+        </p:nvSpPr>
+        <p:spPr>
+          <a:xfrm rot="16200000">
+            <a:off x="3908066" y="3195797"/>
+            <a:ext cx="6858000" cy="466406"/>
+          </a:xfrm>
+          <a:prstGeom prst="rect">
+            <a:avLst/>
+          </a:prstGeom>
+          <a:gradFill>
+            <a:gsLst>
+              <a:gs pos="0">
+                <a:srgbClr val="363D46">
+                  <a:alpha val="0"/>
+                </a:srgbClr>
+              </a:gs>
+              <a:gs pos="100000">
+                <a:srgbClr val="363D46">
+                  <a:lumMod val="75000"/>
+                </a:srgbClr>
+              </a:gs>
+            </a:gsLst>
+            <a:lin ang="5400000" scaled="0"/>
+          </a:gradFill>
+          <a:ln>
+            <a:noFill/>
+          </a:ln>
+          <a:effectLst/>
+        </p:spPr>
+        <p:style>
+          <a:lnRef idx="2">
+            <a:schemeClr val="accent1">
+              <a:shade val="50000"/>
+            </a:schemeClr>
+          </a:lnRef>
+          <a:fillRef idx="1">
+            <a:schemeClr val="accent1"/>
+          </a:fillRef>
+          <a:effectRef idx="0">
+            <a:schemeClr val="accent1"/>
+          </a:effectRef>
+          <a:fontRef idx="minor">
+            <a:schemeClr val="lt1"/>
+          </a:fontRef>
+        </p:style>
+        <p:txBody>
+          <a:bodyPr rot="0" spcFirstLastPara="0" vertOverflow="overflow" horzOverflow="overflow" vert="horz" wrap="square" lIns="91440" tIns="45720" rIns="91440" bIns="45720" numCol="1" spcCol="0" rtlCol="0" fromWordArt="0" anchor="ctr" anchorCtr="0" forceAA="0" compatLnSpc="1">
+            <a:prstTxWarp prst="textNoShape">
+              <a:avLst/>
+            </a:prstTxWarp>
+            <a:noAutofit/>
+          </a:bodyPr>
+          <a:lstStyle/>
+          <a:p>
+            <a:pPr algn="ctr" rtl="0"/>
+            <a:endParaRPr lang="pt-BR" dirty="0"/>
+          </a:p>
+        </p:txBody>
+      </p:sp>
+      <p:cxnSp>
+        <p:nvCxnSpPr>
+          <p:cNvPr id="15" name="Conector Reto 14">
+            <a:extLst>
+              <a:ext uri="{FF2B5EF4-FFF2-40B4-BE49-F238E27FC236}">
+                <a16:creationId xmlns:a16="http://schemas.microsoft.com/office/drawing/2014/main" id="{9F82E424-AAF6-43AC-AC56-03BA23E0C938}"/>
+              </a:ext>
+              <a:ext uri="{C183D7F6-B498-43B3-948B-1728B52AA6E4}">
+                <adec:decorative xmlns:adec="http://schemas.microsoft.com/office/drawing/2017/decorative" val="1"/>
+              </a:ext>
+            </a:extLst>
+          </p:cNvPr>
+          <p:cNvCxnSpPr>
+            <a:cxnSpLocks noGrp="1" noRot="1" noChangeAspect="1" noMove="1" noResize="1" noEditPoints="1" noAdjustHandles="1" noChangeArrowheads="1" noChangeShapeType="1"/>
+          </p:cNvCxnSpPr>
+          <p:nvPr>
+            <p:extLst>
+              <p:ext uri="{386F3935-93C4-4BCD-93E2-E3B085C9AB24}">
+                <p16:designElem xmlns:p16="http://schemas.microsoft.com/office/powerpoint/2015/main" val="1"/>
+              </p:ext>
+            </p:extLst>
+          </p:nvPr>
+        </p:nvCxnSpPr>
+        <p:spPr>
+          <a:xfrm rot="5400000">
+            <a:off x="4150420" y="3429000"/>
+            <a:ext cx="6858000" cy="0"/>
+          </a:xfrm>
+          <a:prstGeom prst="line">
+            <a:avLst/>
+          </a:prstGeom>
+          <a:solidFill>
+            <a:srgbClr val="FFFFFF"/>
+          </a:solidFill>
+          <a:ln w="38100" cap="flat">
+            <a:gradFill flip="none" rotWithShape="1">
+              <a:gsLst>
+                <a:gs pos="0">
+                  <a:srgbClr val="363D46"/>
+                </a:gs>
+                <a:gs pos="100000">
+                  <a:srgbClr val="363D46">
+                    <a:lumMod val="75000"/>
+                  </a:srgbClr>
+                </a:gs>
+              </a:gsLst>
+              <a:lin ang="5400000" scaled="0"/>
+              <a:tileRect/>
+            </a:gradFill>
+            <a:miter lim="800000"/>
+          </a:ln>
+          <a:effectLst>
+            <a:innerShdw blurRad="57150" dist="38100" dir="14460000">
+              <a:srgbClr val="000000">
+                <a:alpha val="70000"/>
+              </a:srgbClr>
+            </a:innerShdw>
+          </a:effectLst>
+        </p:spPr>
+        <p:style>
+          <a:lnRef idx="2">
+            <a:schemeClr val="accent1">
+              <a:shade val="50000"/>
+            </a:schemeClr>
+          </a:lnRef>
+          <a:fillRef idx="1">
+            <a:schemeClr val="accent1"/>
+          </a:fillRef>
+          <a:effectRef idx="0">
+            <a:schemeClr val="accent1"/>
+          </a:effectRef>
+          <a:fontRef idx="minor">
+            <a:schemeClr val="lt1"/>
+          </a:fontRef>
+        </p:style>
+      </p:cxnSp>
+      <p:graphicFrame>
+        <p:nvGraphicFramePr>
+          <p:cNvPr id="6" name="Espaço Reservado para Conteúdo 5" descr="espaço reservado para gráfico">
+            <a:extLst>
+              <a:ext uri="{FF2B5EF4-FFF2-40B4-BE49-F238E27FC236}">
+                <a16:creationId xmlns:a16="http://schemas.microsoft.com/office/drawing/2014/main" id="{4F8339CB-596F-46C7-A612-EA1CB5750EDB}"/>
+              </a:ext>
+            </a:extLst>
+          </p:cNvPr>
+          <p:cNvGraphicFramePr>
+            <a:graphicFrameLocks noGrp="1"/>
+          </p:cNvGraphicFramePr>
+          <p:nvPr>
+            <p:ph idx="1"/>
+          </p:nvPr>
+        </p:nvGraphicFramePr>
+        <p:xfrm>
+          <a:off x="643467" y="643467"/>
+          <a:ext cx="6243992" cy="5571065"/>
+        </p:xfrm>
+        <a:graphic>
+          <a:graphicData uri="http://schemas.openxmlformats.org/drawingml/2006/chart">
+            <c:chart xmlns:c="http://schemas.openxmlformats.org/drawingml/2006/chart" xmlns:r="http://schemas.openxmlformats.org/officeDocument/2006/relationships" r:id="rId4"/>
+          </a:graphicData>
+        </a:graphic>
+      </p:graphicFrame>
+      <p:pic>
+        <p:nvPicPr>
+          <p:cNvPr id="4" name="Imagem 3" descr="Texto&#10;&#10;Descrição gerada automaticamente">
+            <a:extLst>
+              <a:ext uri="{FF2B5EF4-FFF2-40B4-BE49-F238E27FC236}">
+                <a16:creationId xmlns:a16="http://schemas.microsoft.com/office/drawing/2014/main" id="{8F843ABF-9D91-4912-B1BA-E2A78BDAFB1B}"/>
+              </a:ext>
+            </a:extLst>
+          </p:cNvPr>
+          <p:cNvPicPr>
+            <a:picLocks noChangeAspect="1"/>
+          </p:cNvPicPr>
+          <p:nvPr/>
+        </p:nvPicPr>
+        <p:blipFill>
+          <a:blip r:embed="rId5"/>
+          <a:stretch>
+            <a:fillRect/>
+          </a:stretch>
+        </p:blipFill>
+        <p:spPr>
+          <a:xfrm>
+            <a:off x="359758" y="643467"/>
+            <a:ext cx="6828382" cy="5659679"/>
+          </a:xfrm>
+          <a:prstGeom prst="rect">
+            <a:avLst/>
+          </a:prstGeom>
+        </p:spPr>
+      </p:pic>
+      <p:sp>
+        <p:nvSpPr>
+          <p:cNvPr id="23" name="Retângulo 22">
+            <a:extLst>
+              <a:ext uri="{FF2B5EF4-FFF2-40B4-BE49-F238E27FC236}">
+                <a16:creationId xmlns:a16="http://schemas.microsoft.com/office/drawing/2014/main" id="{2A41B889-7059-4848-ADDB-E16C732EC6EC}"/>
+              </a:ext>
+            </a:extLst>
+          </p:cNvPr>
+          <p:cNvSpPr/>
+          <p:nvPr/>
+        </p:nvSpPr>
+        <p:spPr>
+          <a:xfrm>
+            <a:off x="1367161" y="5071531"/>
+            <a:ext cx="2192785" cy="310718"/>
+          </a:xfrm>
+          <a:prstGeom prst="rect">
+            <a:avLst/>
+          </a:prstGeom>
+          <a:noFill/>
+          <a:ln w="38100">
+            <a:solidFill>
+              <a:srgbClr val="FF0000"/>
+            </a:solidFill>
+          </a:ln>
+        </p:spPr>
+        <p:style>
+          <a:lnRef idx="2">
+            <a:schemeClr val="accent1">
+              <a:shade val="50000"/>
+            </a:schemeClr>
+          </a:lnRef>
+          <a:fillRef idx="1">
+            <a:schemeClr val="accent1"/>
+          </a:fillRef>
+          <a:effectRef idx="0">
+            <a:schemeClr val="accent1"/>
+          </a:effectRef>
+          <a:fontRef idx="minor">
+            <a:schemeClr val="lt1"/>
+          </a:fontRef>
+        </p:style>
+        <p:txBody>
+          <a:bodyPr rtlCol="0" anchor="ctr"/>
+          <a:lstStyle/>
+          <a:p>
+            <a:pPr algn="ctr"/>
+            <a:endParaRPr lang="pt-BR"/>
+          </a:p>
+        </p:txBody>
+      </p:sp>
+    </p:spTree>
+    <p:extLst>
+      <p:ext uri="{BB962C8B-B14F-4D97-AF65-F5344CB8AC3E}">
+        <p14:creationId xmlns:p14="http://schemas.microsoft.com/office/powerpoint/2010/main" val="2486764942"/>
+      </p:ext>
+    </p:extLst>
+  </p:cSld>
+  <p:clrMapOvr>
+    <a:masterClrMapping/>
+  </p:clrMapOvr>
+</p:sld>
+</file>
+
+<file path=ppt/slides/slide29.xml><?xml version="1.0" encoding="utf-8"?>
 <p:sld xmlns:a="http://schemas.openxmlformats.org/drawingml/2006/main" xmlns:r="http://schemas.openxmlformats.org/officeDocument/2006/relationships" xmlns:p="http://schemas.openxmlformats.org/presentationml/2006/main">
   <p:cSld>
     <p:bg>
@@ -35652,14 +38198,6 @@
 </file>
 
 <file path=customXml/item1.xml><?xml version="1.0" encoding="utf-8"?>
-<p:properties xmlns:p="http://schemas.microsoft.com/office/2006/metadata/properties" xmlns:xsi="http://www.w3.org/2001/XMLSchema-instance" xmlns:pc="http://schemas.microsoft.com/office/infopath/2007/PartnerControls">
-  <documentManagement>
-    <MediaServiceKeyPoints xmlns="71af3243-3dd4-4a8d-8c0d-dd76da1f02a5" xsi:nil="true"/>
-  </documentManagement>
-</p:properties>
-</file>
-
-<file path=customXml/item2.xml><?xml version="1.0" encoding="utf-8"?>
 <ct:contentTypeSchema xmlns:ct="http://schemas.microsoft.com/office/2006/metadata/contentType" xmlns:ma="http://schemas.microsoft.com/office/2006/metadata/properties/metaAttributes" ct:_="" ma:_="" ma:contentTypeName="Document" ma:contentTypeID="0x01010079F111ED35F8CC479449609E8A0923A6" ma:contentTypeVersion="11" ma:contentTypeDescription="Create a new document." ma:contentTypeScope="" ma:versionID="dc7352e55e77714fab0739bd1a2ce122">
   <xsd:schema xmlns:xsd="http://www.w3.org/2001/XMLSchema" xmlns:xs="http://www.w3.org/2001/XMLSchema" xmlns:p="http://schemas.microsoft.com/office/2006/metadata/properties" xmlns:ns2="71af3243-3dd4-4a8d-8c0d-dd76da1f02a5" xmlns:ns3="16c05727-aa75-4e4a-9b5f-8a80a1165891" targetNamespace="http://schemas.microsoft.com/office/2006/metadata/properties" ma:root="true" ma:fieldsID="b47b806cf7e90fe7257fa1ff83c741bf" ns2:_="" ns3:_="">
     <xsd:import namespace="71af3243-3dd4-4a8d-8c0d-dd76da1f02a5"/>
@@ -35870,6 +38408,14 @@
 </ct:contentTypeSchema>
 </file>
 
+<file path=customXml/item2.xml><?xml version="1.0" encoding="utf-8"?>
+<p:properties xmlns:p="http://schemas.microsoft.com/office/2006/metadata/properties" xmlns:xsi="http://www.w3.org/2001/XMLSchema-instance" xmlns:pc="http://schemas.microsoft.com/office/infopath/2007/PartnerControls">
+  <documentManagement>
+    <MediaServiceKeyPoints xmlns="71af3243-3dd4-4a8d-8c0d-dd76da1f02a5" xsi:nil="true"/>
+  </documentManagement>
+</p:properties>
+</file>
+
 <file path=customXml/item3.xml><?xml version="1.0" encoding="utf-8"?>
 <?mso-contentType ?>
 <FormTemplates xmlns="http://schemas.microsoft.com/sharepoint/v3/contenttype/forms">
@@ -35880,16 +38426,6 @@
 </file>
 
 <file path=customXml/itemProps1.xml><?xml version="1.0" encoding="utf-8"?>
-<ds:datastoreItem xmlns:ds="http://schemas.openxmlformats.org/officeDocument/2006/customXml" ds:itemID="{DBA0466F-55BA-4B4C-B910-3BFE9417EB92}">
-  <ds:schemaRefs>
-    <ds:schemaRef ds:uri="http://schemas.microsoft.com/office/2006/metadata/properties"/>
-    <ds:schemaRef ds:uri="http://schemas.microsoft.com/office/infopath/2007/PartnerControls"/>
-    <ds:schemaRef ds:uri="71af3243-3dd4-4a8d-8c0d-dd76da1f02a5"/>
-  </ds:schemaRefs>
-</ds:datastoreItem>
-</file>
-
-<file path=customXml/itemProps2.xml><?xml version="1.0" encoding="utf-8"?>
 <ds:datastoreItem xmlns:ds="http://schemas.openxmlformats.org/officeDocument/2006/customXml" ds:itemID="{F13075A8-A5B0-4ED9-ACD9-B97630E65A2D}">
   <ds:schemaRefs>
     <ds:schemaRef ds:uri="http://schemas.microsoft.com/office/2006/metadata/contentType"/>
@@ -35908,6 +38444,16 @@
 </ds:datastoreItem>
 </file>
 
+<file path=customXml/itemProps2.xml><?xml version="1.0" encoding="utf-8"?>
+<ds:datastoreItem xmlns:ds="http://schemas.openxmlformats.org/officeDocument/2006/customXml" ds:itemID="{DBA0466F-55BA-4B4C-B910-3BFE9417EB92}">
+  <ds:schemaRefs>
+    <ds:schemaRef ds:uri="http://schemas.microsoft.com/office/2006/metadata/properties"/>
+    <ds:schemaRef ds:uri="http://schemas.microsoft.com/office/infopath/2007/PartnerControls"/>
+    <ds:schemaRef ds:uri="71af3243-3dd4-4a8d-8c0d-dd76da1f02a5"/>
+  </ds:schemaRefs>
+</ds:datastoreItem>
+</file>
+
 <file path=customXml/itemProps3.xml><?xml version="1.0" encoding="utf-8"?>
 <ds:datastoreItem xmlns:ds="http://schemas.openxmlformats.org/officeDocument/2006/customXml" ds:itemID="{07235EAC-5FEE-4CF4-B627-4AC327BD042D}">
   <ds:schemaRefs>

</xml_diff>